<commit_message>
Update Power Sub-Mesh Construction in Multiple Power Domain Design.pptx
</commit_message>
<xml_diff>
--- a/GM/powerplan/Power Sub-Mesh Construction in Multiple Power Domain Design/Power Sub-Mesh Construction in Multiple Power Domain Design.pptx
+++ b/GM/powerplan/Power Sub-Mesh Construction in Multiple Power Domain Design/Power Sub-Mesh Construction in Multiple Power Domain Design.pptx
@@ -5,37 +5,41 @@
     <p:sldMasterId id="2147483648" r:id="rId1"/>
   </p:sldMasterIdLst>
   <p:notesMasterIdLst>
-    <p:notesMasterId r:id="rId30"/>
+    <p:notesMasterId r:id="rId34"/>
   </p:notesMasterIdLst>
   <p:sldIdLst>
     <p:sldId id="256" r:id="rId2"/>
     <p:sldId id="299" r:id="rId3"/>
-    <p:sldId id="300" r:id="rId4"/>
-    <p:sldId id="304" r:id="rId5"/>
-    <p:sldId id="305" r:id="rId6"/>
-    <p:sldId id="306" r:id="rId7"/>
-    <p:sldId id="303" r:id="rId8"/>
-    <p:sldId id="301" r:id="rId9"/>
-    <p:sldId id="302" r:id="rId10"/>
-    <p:sldId id="307" r:id="rId11"/>
-    <p:sldId id="308" r:id="rId12"/>
-    <p:sldId id="309" r:id="rId13"/>
-    <p:sldId id="310" r:id="rId14"/>
-    <p:sldId id="311" r:id="rId15"/>
-    <p:sldId id="312" r:id="rId16"/>
-    <p:sldId id="313" r:id="rId17"/>
-    <p:sldId id="314" r:id="rId18"/>
-    <p:sldId id="315" r:id="rId19"/>
-    <p:sldId id="316" r:id="rId20"/>
-    <p:sldId id="317" r:id="rId21"/>
-    <p:sldId id="318" r:id="rId22"/>
-    <p:sldId id="319" r:id="rId23"/>
-    <p:sldId id="321" r:id="rId24"/>
-    <p:sldId id="320" r:id="rId25"/>
-    <p:sldId id="323" r:id="rId26"/>
-    <p:sldId id="324" r:id="rId27"/>
-    <p:sldId id="325" r:id="rId28"/>
-    <p:sldId id="298" r:id="rId29"/>
+    <p:sldId id="326" r:id="rId4"/>
+    <p:sldId id="300" r:id="rId5"/>
+    <p:sldId id="304" r:id="rId6"/>
+    <p:sldId id="305" r:id="rId7"/>
+    <p:sldId id="306" r:id="rId8"/>
+    <p:sldId id="303" r:id="rId9"/>
+    <p:sldId id="327" r:id="rId10"/>
+    <p:sldId id="301" r:id="rId11"/>
+    <p:sldId id="302" r:id="rId12"/>
+    <p:sldId id="307" r:id="rId13"/>
+    <p:sldId id="328" r:id="rId14"/>
+    <p:sldId id="308" r:id="rId15"/>
+    <p:sldId id="309" r:id="rId16"/>
+    <p:sldId id="310" r:id="rId17"/>
+    <p:sldId id="311" r:id="rId18"/>
+    <p:sldId id="312" r:id="rId19"/>
+    <p:sldId id="313" r:id="rId20"/>
+    <p:sldId id="314" r:id="rId21"/>
+    <p:sldId id="315" r:id="rId22"/>
+    <p:sldId id="316" r:id="rId23"/>
+    <p:sldId id="317" r:id="rId24"/>
+    <p:sldId id="329" r:id="rId25"/>
+    <p:sldId id="318" r:id="rId26"/>
+    <p:sldId id="319" r:id="rId27"/>
+    <p:sldId id="321" r:id="rId28"/>
+    <p:sldId id="320" r:id="rId29"/>
+    <p:sldId id="323" r:id="rId30"/>
+    <p:sldId id="324" r:id="rId31"/>
+    <p:sldId id="325" r:id="rId32"/>
+    <p:sldId id="298" r:id="rId33"/>
   </p:sldIdLst>
   <p:sldSz cx="12192000" cy="6858000"/>
   <p:notesSz cx="6858000" cy="9144000"/>
@@ -1944,7 +1948,7 @@
           <a:p>
             <a:fld id="{C9ED61FB-B9B0-4D85-A72E-A614C28ECC4E}" type="datetimeFigureOut">
               <a:rPr lang="en-US" smtClean="0"/>
-              <a:t>5/13/2024</a:t>
+              <a:t>5/15/2024</a:t>
             </a:fld>
             <a:endParaRPr lang="en-US"/>
           </a:p>
@@ -2363,7 +2367,7 @@
           <a:p>
             <a:fld id="{9D457EAB-1485-47AD-BEAD-484FAEBF5A54}" type="slidenum">
               <a:rPr lang="en-US" smtClean="0"/>
-              <a:t>3</a:t>
+              <a:t>4</a:t>
             </a:fld>
             <a:endParaRPr lang="en-US"/>
           </a:p>
@@ -2508,7 +2512,7 @@
           <a:p>
             <a:fld id="{9D457EAB-1485-47AD-BEAD-484FAEBF5A54}" type="slidenum">
               <a:rPr lang="en-US" smtClean="0"/>
-              <a:t>5</a:t>
+              <a:t>6</a:t>
             </a:fld>
             <a:endParaRPr lang="en-US"/>
           </a:p>
@@ -2592,7 +2596,7 @@
           <a:p>
             <a:fld id="{9D457EAB-1485-47AD-BEAD-484FAEBF5A54}" type="slidenum">
               <a:rPr lang="en-US" smtClean="0"/>
-              <a:t>7</a:t>
+              <a:t>9</a:t>
             </a:fld>
             <a:endParaRPr lang="en-US"/>
           </a:p>
@@ -2693,7 +2697,7 @@
           <a:p>
             <a:fld id="{9D457EAB-1485-47AD-BEAD-484FAEBF5A54}" type="slidenum">
               <a:rPr lang="en-US" smtClean="0"/>
-              <a:t>8</a:t>
+              <a:t>10</a:t>
             </a:fld>
             <a:endParaRPr lang="en-US"/>
           </a:p>
@@ -2777,7 +2781,7 @@
           <a:p>
             <a:fld id="{9D457EAB-1485-47AD-BEAD-484FAEBF5A54}" type="slidenum">
               <a:rPr lang="en-US" smtClean="0"/>
-              <a:t>12</a:t>
+              <a:t>15</a:t>
             </a:fld>
             <a:endParaRPr lang="en-US"/>
           </a:p>
@@ -2877,7 +2881,7 @@
           <a:p>
             <a:fld id="{9D457EAB-1485-47AD-BEAD-484FAEBF5A54}" type="slidenum">
               <a:rPr lang="en-US" smtClean="0"/>
-              <a:t>14</a:t>
+              <a:t>17</a:t>
             </a:fld>
             <a:endParaRPr lang="en-US"/>
           </a:p>
@@ -2985,7 +2989,7 @@
           <a:p>
             <a:fld id="{9D457EAB-1485-47AD-BEAD-484FAEBF5A54}" type="slidenum">
               <a:rPr lang="en-US" smtClean="0"/>
-              <a:t>18</a:t>
+              <a:t>21</a:t>
             </a:fld>
             <a:endParaRPr lang="en-US"/>
           </a:p>
@@ -3183,7 +3187,7 @@
           <a:p>
             <a:fld id="{9D457EAB-1485-47AD-BEAD-484FAEBF5A54}" type="slidenum">
               <a:rPr lang="en-US" smtClean="0"/>
-              <a:t>23</a:t>
+              <a:t>27</a:t>
             </a:fld>
             <a:endParaRPr lang="en-US"/>
           </a:p>
@@ -3349,7 +3353,7 @@
           <a:p>
             <a:fld id="{99BA7BAB-F69F-4C21-8D40-7AA273A2D01F}" type="datetime1">
               <a:rPr lang="en-US" smtClean="0"/>
-              <a:t>5/13/2024</a:t>
+              <a:t>5/15/2024</a:t>
             </a:fld>
             <a:endParaRPr lang="en-US"/>
           </a:p>
@@ -3554,7 +3558,7 @@
           <a:p>
             <a:fld id="{FB00A8EC-4678-43EE-BE64-F312B7F1A46F}" type="datetime1">
               <a:rPr lang="en-US" smtClean="0"/>
-              <a:t>5/13/2024</a:t>
+              <a:t>5/15/2024</a:t>
             </a:fld>
             <a:endParaRPr lang="en-US"/>
           </a:p>
@@ -3762,7 +3766,7 @@
           <a:p>
             <a:fld id="{9487F23D-EA8F-4C56-9373-23F6109AD11F}" type="datetime1">
               <a:rPr lang="en-US" smtClean="0"/>
-              <a:t>5/13/2024</a:t>
+              <a:t>5/15/2024</a:t>
             </a:fld>
             <a:endParaRPr lang="en-US"/>
           </a:p>
@@ -3960,7 +3964,7 @@
           <a:p>
             <a:fld id="{A34E716E-0239-4A81-9CF4-D3B9651721CF}" type="datetime1">
               <a:rPr lang="en-US" smtClean="0"/>
-              <a:t>5/13/2024</a:t>
+              <a:t>5/15/2024</a:t>
             </a:fld>
             <a:endParaRPr lang="en-US"/>
           </a:p>
@@ -4242,7 +4246,7 @@
           <a:p>
             <a:fld id="{CC112E56-3D97-4B86-935C-1C493DD86A08}" type="datetime1">
               <a:rPr lang="en-US" smtClean="0"/>
-              <a:t>5/13/2024</a:t>
+              <a:t>5/15/2024</a:t>
             </a:fld>
             <a:endParaRPr lang="en-US"/>
           </a:p>
@@ -4507,7 +4511,7 @@
           <a:p>
             <a:fld id="{40649135-BABF-4F63-9AF8-3CEC545E47DC}" type="datetime1">
               <a:rPr lang="en-US" smtClean="0"/>
-              <a:t>5/13/2024</a:t>
+              <a:t>5/15/2024</a:t>
             </a:fld>
             <a:endParaRPr lang="en-US"/>
           </a:p>
@@ -4919,7 +4923,7 @@
           <a:p>
             <a:fld id="{B16EBC02-C9C0-442D-A8A6-494057203542}" type="datetime1">
               <a:rPr lang="en-US" smtClean="0"/>
-              <a:t>5/13/2024</a:t>
+              <a:t>5/15/2024</a:t>
             </a:fld>
             <a:endParaRPr lang="en-US"/>
           </a:p>
@@ -5060,7 +5064,7 @@
           <a:p>
             <a:fld id="{A126C4B4-559D-414E-BC9C-16A745BBF3C3}" type="datetime1">
               <a:rPr lang="en-US" smtClean="0"/>
-              <a:t>5/13/2024</a:t>
+              <a:t>5/15/2024</a:t>
             </a:fld>
             <a:endParaRPr lang="en-US"/>
           </a:p>
@@ -5173,7 +5177,7 @@
           <a:p>
             <a:fld id="{0D49D49E-73A5-4C03-BFEA-3D845EB044D8}" type="datetime1">
               <a:rPr lang="en-US" smtClean="0"/>
-              <a:t>5/13/2024</a:t>
+              <a:t>5/15/2024</a:t>
             </a:fld>
             <a:endParaRPr lang="en-US"/>
           </a:p>
@@ -5484,7 +5488,7 @@
           <a:p>
             <a:fld id="{4A0F93E6-3134-410C-B573-A5F6B38FC346}" type="datetime1">
               <a:rPr lang="en-US" smtClean="0"/>
-              <a:t>5/13/2024</a:t>
+              <a:t>5/15/2024</a:t>
             </a:fld>
             <a:endParaRPr lang="en-US"/>
           </a:p>
@@ -5772,7 +5776,7 @@
           <a:p>
             <a:fld id="{F766E70F-5320-45A5-BE33-1819A93C2AF4}" type="datetime1">
               <a:rPr lang="en-US" smtClean="0"/>
-              <a:t>5/13/2024</a:t>
+              <a:t>5/15/2024</a:t>
             </a:fld>
             <a:endParaRPr lang="en-US"/>
           </a:p>
@@ -6013,7 +6017,7 @@
           <a:p>
             <a:fld id="{A706458B-0289-40FF-A02D-2C541B7F1CB6}" type="datetime1">
               <a:rPr lang="en-US" smtClean="0"/>
-              <a:t>5/13/2024</a:t>
+              <a:t>5/15/2024</a:t>
             </a:fld>
             <a:endParaRPr lang="en-US"/>
           </a:p>
@@ -6834,7 +6838,7 @@
           <p:cNvPr id="2" name="標題 1">
             <a:extLst>
               <a:ext uri="{FF2B5EF4-FFF2-40B4-BE49-F238E27FC236}">
-                <a16:creationId xmlns:a16="http://schemas.microsoft.com/office/drawing/2014/main" id="{5286E359-E626-B493-ABAF-94D504ABD4C3}"/>
+                <a16:creationId xmlns:a16="http://schemas.microsoft.com/office/drawing/2014/main" id="{AE5CDEBA-F7CB-4423-D17F-78C9E7A6B544}"/>
               </a:ext>
             </a:extLst>
           </p:cNvPr>
@@ -6851,10 +6855,16 @@
           <a:lstStyle/>
           <a:p>
             <a:r>
-              <a:rPr lang="en-US" altLang="zh-TW" sz="4000" dirty="0"/>
+              <a:rPr lang="en-US" altLang="zh-TW" sz="4000" dirty="0">
+                <a:latin typeface="Times" panose="02020603050405020304" pitchFamily="18" charset="0"/>
+                <a:cs typeface="Times" panose="02020603050405020304" pitchFamily="18" charset="0"/>
+              </a:rPr>
               <a:t>Preliminaries</a:t>
             </a:r>
-            <a:endParaRPr lang="zh-TW" altLang="en-US" dirty="0"/>
+            <a:endParaRPr lang="zh-TW" altLang="en-US" dirty="0">
+              <a:latin typeface="Times" panose="02020603050405020304" pitchFamily="18" charset="0"/>
+              <a:cs typeface="Times" panose="02020603050405020304" pitchFamily="18" charset="0"/>
+            </a:endParaRPr>
           </a:p>
         </p:txBody>
       </p:sp>
@@ -6863,7 +6873,7 @@
           <p:cNvPr id="3" name="內容版面配置區 2">
             <a:extLst>
               <a:ext uri="{FF2B5EF4-FFF2-40B4-BE49-F238E27FC236}">
-                <a16:creationId xmlns:a16="http://schemas.microsoft.com/office/drawing/2014/main" id="{64602112-5F7A-7122-5DB0-E3E666D8CB39}"/>
+                <a16:creationId xmlns:a16="http://schemas.microsoft.com/office/drawing/2014/main" id="{2BF1C42E-208D-D375-D779-4FE5706E52D6}"/>
               </a:ext>
             </a:extLst>
           </p:cNvPr>
@@ -6876,12 +6886,14 @@
         </p:nvSpPr>
         <p:spPr>
           <a:xfrm>
-            <a:off x="838200" y="1690688"/>
-            <a:ext cx="10515600" cy="4486275"/>
+            <a:off x="838200" y="1619999"/>
+            <a:ext cx="10515600" cy="5101475"/>
           </a:xfrm>
         </p:spPr>
         <p:txBody>
-          <a:bodyPr/>
+          <a:bodyPr>
+            <a:normAutofit/>
+          </a:bodyPr>
           <a:lstStyle/>
           <a:p>
             <a:pPr>
@@ -6890,8 +6902,10 @@
               </a:lnSpc>
             </a:pPr>
             <a:r>
-              <a:rPr lang="en-US" altLang="zh-TW" sz="2200" dirty="0"/>
-              <a:t>Input</a:t>
+              <a:rPr lang="en-US" altLang="zh-TW" sz="2200" dirty="0">
+                <a:latin typeface="+mj-lt"/>
+              </a:rPr>
+              <a:t>Power Domain</a:t>
             </a:r>
           </a:p>
           <a:p>
@@ -6901,8 +6915,22 @@
               </a:lnSpc>
             </a:pPr>
             <a:r>
-              <a:rPr lang="en-US" altLang="zh-TW" sz="1800" dirty="0"/>
-              <a:t>A timing-driven placed and clock-routed multiple power domain design.</a:t>
+              <a:rPr lang="en-US" altLang="zh-TW" sz="1800" dirty="0">
+                <a:latin typeface="+mj-lt"/>
+              </a:rPr>
+              <a:t>A collection of cells that use the </a:t>
+            </a:r>
+            <a:r>
+              <a:rPr lang="en-US" altLang="zh-TW" sz="1800" b="1" dirty="0">
+                <a:latin typeface="+mj-lt"/>
+              </a:rPr>
+              <a:t>same power supply </a:t>
+            </a:r>
+            <a:r>
+              <a:rPr lang="en-US" altLang="zh-TW" sz="1800" dirty="0">
+                <a:latin typeface="+mj-lt"/>
+              </a:rPr>
+              <a:t>during normal operation.</a:t>
             </a:r>
           </a:p>
           <a:p>
@@ -6912,9 +6940,21 @@
               </a:lnSpc>
             </a:pPr>
             <a:r>
-              <a:rPr lang="en-US" altLang="zh-TW" sz="1800" dirty="0"/>
-              <a:t>A set of cross-domain cells and corresponding power sources, primary power mesh and signal routing distributions.</a:t>
-            </a:r>
+              <a:rPr lang="en-US" altLang="zh-TW" sz="1800" dirty="0">
+                <a:latin typeface="+mj-lt"/>
+              </a:rPr>
+              <a:t>Can be switched on or off at the same time.</a:t>
+            </a:r>
+          </a:p>
+          <a:p>
+            <a:pPr lvl="1">
+              <a:lnSpc>
+                <a:spcPct val="150000"/>
+              </a:lnSpc>
+            </a:pPr>
+            <a:endParaRPr lang="en-US" altLang="zh-TW" sz="100" dirty="0">
+              <a:latin typeface="+mj-lt"/>
+            </a:endParaRPr>
           </a:p>
           <a:p>
             <a:pPr>
@@ -6923,8 +6963,10 @@
               </a:lnSpc>
             </a:pPr>
             <a:r>
-              <a:rPr lang="en-US" altLang="zh-TW" sz="2200" dirty="0"/>
-              <a:t>Goal</a:t>
+              <a:rPr lang="en-US" altLang="zh-TW" sz="2200" dirty="0">
+                <a:latin typeface="+mj-lt"/>
+              </a:rPr>
+              <a:t>There are numerous multiple power domain cells (cross domain cells)</a:t>
             </a:r>
           </a:p>
           <a:p>
@@ -6934,8 +6976,10 @@
               </a:lnSpc>
             </a:pPr>
             <a:r>
-              <a:rPr lang="en-US" altLang="zh-TW" sz="1800" dirty="0"/>
-              <a:t>To construct power sub-meshes such that the IR drop constraints on cross-domain cells are satisfied.</a:t>
+              <a:rPr lang="en-US" altLang="zh-TW" sz="1800" dirty="0">
+                <a:latin typeface="+mj-lt"/>
+              </a:rPr>
+              <a:t>Always-on buffers/inverters, retention flip-flops, isolation cells.</a:t>
             </a:r>
           </a:p>
           <a:p>
@@ -6945,10 +6989,82 @@
               </a:lnSpc>
             </a:pPr>
             <a:r>
-              <a:rPr lang="en-US" altLang="zh-TW" sz="1800" dirty="0"/>
-              <a:t>Design rule violations on signal routing are minimized without timing degradation.</a:t>
-            </a:r>
-            <a:endParaRPr lang="zh-TW" altLang="en-US" sz="1800" dirty="0"/>
+              <a:rPr lang="en-US" altLang="zh-TW" sz="1800" dirty="0">
+                <a:latin typeface="+mj-lt"/>
+              </a:rPr>
+              <a:t>They contain pins called secondary power pin.</a:t>
+            </a:r>
+          </a:p>
+          <a:p>
+            <a:pPr lvl="1">
+              <a:lnSpc>
+                <a:spcPct val="150000"/>
+              </a:lnSpc>
+            </a:pPr>
+            <a:endParaRPr lang="en-US" altLang="zh-TW" sz="100" dirty="0">
+              <a:latin typeface="+mj-lt"/>
+            </a:endParaRPr>
+          </a:p>
+          <a:p>
+            <a:pPr>
+              <a:lnSpc>
+                <a:spcPct val="150000"/>
+              </a:lnSpc>
+            </a:pPr>
+            <a:r>
+              <a:rPr lang="en-US" altLang="zh-TW" sz="2200" dirty="0">
+                <a:latin typeface="+mj-lt"/>
+              </a:rPr>
+              <a:t>There are 2 types of power source for a cross-domain cell</a:t>
+            </a:r>
+          </a:p>
+          <a:p>
+            <a:pPr lvl="1">
+              <a:lnSpc>
+                <a:spcPct val="150000"/>
+              </a:lnSpc>
+            </a:pPr>
+            <a:r>
+              <a:rPr lang="en-US" altLang="zh-TW" sz="1800" u="sng" dirty="0">
+                <a:latin typeface="+mj-lt"/>
+              </a:rPr>
+              <a:t>Direct supply</a:t>
+            </a:r>
+            <a:r>
+              <a:rPr lang="en-US" altLang="zh-TW" sz="1800" dirty="0">
+                <a:latin typeface="+mj-lt"/>
+              </a:rPr>
+              <a:t>:    primary power mesh directly supplies power to the cross-domain cells.</a:t>
+            </a:r>
+          </a:p>
+          <a:p>
+            <a:pPr lvl="1">
+              <a:lnSpc>
+                <a:spcPct val="150000"/>
+              </a:lnSpc>
+            </a:pPr>
+            <a:r>
+              <a:rPr lang="en-US" altLang="zh-TW" sz="1800" u="sng" dirty="0">
+                <a:latin typeface="+mj-lt"/>
+              </a:rPr>
+              <a:t>Indirect supply</a:t>
+            </a:r>
+            <a:r>
+              <a:rPr lang="en-US" altLang="zh-TW" sz="1800" dirty="0">
+                <a:latin typeface="+mj-lt"/>
+              </a:rPr>
+              <a:t>:  power gating cell (MTCMOS), level shifter.</a:t>
+            </a:r>
+          </a:p>
+          <a:p>
+            <a:pPr lvl="1">
+              <a:lnSpc>
+                <a:spcPct val="150000"/>
+              </a:lnSpc>
+            </a:pPr>
+            <a:endParaRPr lang="en-US" altLang="zh-TW" sz="1800" dirty="0">
+              <a:latin typeface="+mj-lt"/>
+            </a:endParaRPr>
           </a:p>
         </p:txBody>
       </p:sp>
@@ -6957,7 +7073,7 @@
           <p:cNvPr id="4" name="投影片編號版面配置區 3">
             <a:extLst>
               <a:ext uri="{FF2B5EF4-FFF2-40B4-BE49-F238E27FC236}">
-                <a16:creationId xmlns:a16="http://schemas.microsoft.com/office/drawing/2014/main" id="{BEB3191F-3D5D-B9EF-1EDE-CD891F6DB1AD}"/>
+                <a16:creationId xmlns:a16="http://schemas.microsoft.com/office/drawing/2014/main" id="{75FE7E51-3153-478A-D8A4-7E30B3D4AF4C}"/>
               </a:ext>
             </a:extLst>
           </p:cNvPr>
@@ -6984,7 +7100,7 @@
     </p:spTree>
     <p:extLst>
       <p:ext uri="{BB962C8B-B14F-4D97-AF65-F5344CB8AC3E}">
-        <p14:creationId xmlns:p14="http://schemas.microsoft.com/office/powerpoint/2010/main" val="3031697280"/>
+        <p14:creationId xmlns:p14="http://schemas.microsoft.com/office/powerpoint/2010/main" val="1133187789"/>
       </p:ext>
     </p:extLst>
   </p:cSld>
@@ -7016,7 +7132,7 @@
           <p:cNvPr id="2" name="標題 1">
             <a:extLst>
               <a:ext uri="{FF2B5EF4-FFF2-40B4-BE49-F238E27FC236}">
-                <a16:creationId xmlns:a16="http://schemas.microsoft.com/office/drawing/2014/main" id="{27366C51-2F74-B127-3481-5D12174C21C1}"/>
+                <a16:creationId xmlns:a16="http://schemas.microsoft.com/office/drawing/2014/main" id="{AE5CDEBA-F7CB-4423-D17F-78C9E7A6B544}"/>
               </a:ext>
             </a:extLst>
           </p:cNvPr>
@@ -7033,75 +7149,460 @@
           <a:lstStyle/>
           <a:p>
             <a:r>
-              <a:rPr lang="en-US" altLang="zh-TW" sz="4000" dirty="0"/>
-              <a:t>Methodology</a:t>
-            </a:r>
-            <a:endParaRPr lang="zh-TW" altLang="en-US" dirty="0"/>
+              <a:rPr lang="en-US" altLang="zh-TW" sz="4000" dirty="0">
+                <a:latin typeface="Times" panose="02020603050405020304" pitchFamily="18" charset="0"/>
+                <a:cs typeface="Times" panose="02020603050405020304" pitchFamily="18" charset="0"/>
+              </a:rPr>
+              <a:t>Preliminaries</a:t>
+            </a:r>
+            <a:endParaRPr lang="zh-TW" altLang="en-US" dirty="0">
+              <a:latin typeface="Times" panose="02020603050405020304" pitchFamily="18" charset="0"/>
+              <a:cs typeface="Times" panose="02020603050405020304" pitchFamily="18" charset="0"/>
+            </a:endParaRPr>
+          </a:p>
+        </p:txBody>
+      </p:sp>
+      <mc:AlternateContent xmlns:mc="http://schemas.openxmlformats.org/markup-compatibility/2006" xmlns:a14="http://schemas.microsoft.com/office/drawing/2010/main">
+        <mc:Choice Requires="a14">
+          <p:sp>
+            <p:nvSpPr>
+              <p:cNvPr id="3" name="內容版面配置區 2">
+                <a:extLst>
+                  <a:ext uri="{FF2B5EF4-FFF2-40B4-BE49-F238E27FC236}">
+                    <a16:creationId xmlns:a16="http://schemas.microsoft.com/office/drawing/2014/main" id="{2BF1C42E-208D-D375-D779-4FE5706E52D6}"/>
+                  </a:ext>
+                </a:extLst>
+              </p:cNvPr>
+              <p:cNvSpPr>
+                <a:spLocks noGrp="1"/>
+              </p:cNvSpPr>
+              <p:nvPr>
+                <p:ph idx="1"/>
+              </p:nvPr>
+            </p:nvSpPr>
+            <p:spPr>
+              <a:xfrm>
+                <a:off x="838200" y="1620000"/>
+                <a:ext cx="10515600" cy="4895850"/>
+              </a:xfrm>
+            </p:spPr>
+            <p:txBody>
+              <a:bodyPr>
+                <a:normAutofit/>
+              </a:bodyPr>
+              <a:lstStyle/>
+              <a:p>
+                <a:pPr>
+                  <a:lnSpc>
+                    <a:spcPct val="150000"/>
+                  </a:lnSpc>
+                </a:pPr>
+                <a:r>
+                  <a:rPr lang="en-US" altLang="zh-TW" sz="2200" dirty="0">
+                    <a:latin typeface="+mj-lt"/>
+                  </a:rPr>
+                  <a:t>Static IR drop:</a:t>
+                </a:r>
+              </a:p>
+              <a:p>
+                <a:pPr lvl="1">
+                  <a:lnSpc>
+                    <a:spcPct val="150000"/>
+                  </a:lnSpc>
+                </a:pPr>
+                <a:r>
+                  <a:rPr lang="en-US" altLang="zh-TW" sz="1800" dirty="0">
+                    <a:latin typeface="+mj-lt"/>
+                  </a:rPr>
+                  <a:t>Measure the weakness of the overall power delivery network.</a:t>
+                </a:r>
+              </a:p>
+              <a:p>
+                <a:pPr lvl="1">
+                  <a:lnSpc>
+                    <a:spcPct val="150000"/>
+                  </a:lnSpc>
+                </a:pPr>
+                <a14:m>
+                  <m:oMath xmlns:m="http://schemas.openxmlformats.org/officeDocument/2006/math">
+                    <m:sSub>
+                      <m:sSubPr>
+                        <m:ctrlPr>
+                          <a:rPr lang="en-US" altLang="zh-TW" sz="1800" i="1" smtClean="0">
+                            <a:latin typeface="Cambria Math" panose="02040503050406030204" pitchFamily="18" charset="0"/>
+                          </a:rPr>
+                        </m:ctrlPr>
+                      </m:sSubPr>
+                      <m:e>
+                        <m:r>
+                          <a:rPr lang="en-US" altLang="zh-TW" sz="1800" b="0" i="1" smtClean="0">
+                            <a:latin typeface="Cambria Math" panose="02040503050406030204" pitchFamily="18" charset="0"/>
+                          </a:rPr>
+                          <m:t>𝑉</m:t>
+                        </m:r>
+                      </m:e>
+                      <m:sub>
+                        <m:r>
+                          <a:rPr lang="en-US" altLang="zh-TW" sz="1800" b="0" i="1" smtClean="0">
+                            <a:latin typeface="Cambria Math" panose="02040503050406030204" pitchFamily="18" charset="0"/>
+                          </a:rPr>
+                          <m:t>𝑠𝑡𝑎𝑡𝑖𝑐</m:t>
+                        </m:r>
+                        <m:r>
+                          <a:rPr lang="en-US" altLang="zh-TW" sz="1800" b="0" i="1" smtClean="0">
+                            <a:latin typeface="Cambria Math" panose="02040503050406030204" pitchFamily="18" charset="0"/>
+                          </a:rPr>
+                          <m:t>_</m:t>
+                        </m:r>
+                        <m:r>
+                          <a:rPr lang="en-US" altLang="zh-TW" sz="1800" b="0" i="1" smtClean="0">
+                            <a:latin typeface="Cambria Math" panose="02040503050406030204" pitchFamily="18" charset="0"/>
+                          </a:rPr>
+                          <m:t>𝑑𝑟𝑜𝑝</m:t>
+                        </m:r>
+                      </m:sub>
+                    </m:sSub>
+                    <m:r>
+                      <a:rPr lang="en-US" altLang="zh-TW" sz="1800" b="0" i="1" smtClean="0">
+                        <a:latin typeface="Cambria Math" panose="02040503050406030204" pitchFamily="18" charset="0"/>
+                      </a:rPr>
+                      <m:t>= </m:t>
+                    </m:r>
+                    <m:sSub>
+                      <m:sSubPr>
+                        <m:ctrlPr>
+                          <a:rPr lang="en-US" altLang="zh-TW" sz="1800" b="0" i="1" smtClean="0">
+                            <a:latin typeface="Cambria Math" panose="02040503050406030204" pitchFamily="18" charset="0"/>
+                          </a:rPr>
+                        </m:ctrlPr>
+                      </m:sSubPr>
+                      <m:e>
+                        <m:r>
+                          <a:rPr lang="en-US" altLang="zh-TW" sz="1800" b="0" i="1" smtClean="0">
+                            <a:latin typeface="Cambria Math" panose="02040503050406030204" pitchFamily="18" charset="0"/>
+                          </a:rPr>
+                          <m:t>𝐼</m:t>
+                        </m:r>
+                      </m:e>
+                      <m:sub>
+                        <m:r>
+                          <a:rPr lang="en-US" altLang="zh-TW" sz="1800" b="0" i="1" smtClean="0">
+                            <a:latin typeface="Cambria Math" panose="02040503050406030204" pitchFamily="18" charset="0"/>
+                          </a:rPr>
+                          <m:t>𝑎𝑣𝑔</m:t>
+                        </m:r>
+                      </m:sub>
+                    </m:sSub>
+                    <m:r>
+                      <a:rPr lang="en-US" altLang="zh-TW" sz="1800" b="0" i="1" smtClean="0">
+                        <a:latin typeface="Cambria Math" panose="02040503050406030204" pitchFamily="18" charset="0"/>
+                      </a:rPr>
+                      <m:t> </m:t>
+                    </m:r>
+                    <m:r>
+                      <a:rPr lang="en-US" altLang="zh-TW" sz="1800" b="0" i="1" smtClean="0">
+                        <a:latin typeface="Cambria Math" panose="02040503050406030204" pitchFamily="18" charset="0"/>
+                        <a:ea typeface="Cambria Math" panose="02040503050406030204" pitchFamily="18" charset="0"/>
+                      </a:rPr>
+                      <m:t>× </m:t>
+                    </m:r>
+                    <m:sSub>
+                      <m:sSubPr>
+                        <m:ctrlPr>
+                          <a:rPr lang="en-US" altLang="zh-TW" sz="1800" b="0" i="1" smtClean="0">
+                            <a:latin typeface="Cambria Math" panose="02040503050406030204" pitchFamily="18" charset="0"/>
+                            <a:ea typeface="Cambria Math" panose="02040503050406030204" pitchFamily="18" charset="0"/>
+                          </a:rPr>
+                        </m:ctrlPr>
+                      </m:sSubPr>
+                      <m:e>
+                        <m:r>
+                          <a:rPr lang="en-US" altLang="zh-TW" sz="1800" b="0" i="1" smtClean="0">
+                            <a:latin typeface="Cambria Math" panose="02040503050406030204" pitchFamily="18" charset="0"/>
+                            <a:ea typeface="Cambria Math" panose="02040503050406030204" pitchFamily="18" charset="0"/>
+                          </a:rPr>
+                          <m:t>𝑅</m:t>
+                        </m:r>
+                      </m:e>
+                      <m:sub>
+                        <m:r>
+                          <a:rPr lang="en-US" altLang="zh-TW" sz="1800" b="0" i="1" smtClean="0">
+                            <a:latin typeface="Cambria Math" panose="02040503050406030204" pitchFamily="18" charset="0"/>
+                            <a:ea typeface="Cambria Math" panose="02040503050406030204" pitchFamily="18" charset="0"/>
+                          </a:rPr>
+                          <m:t>𝑤𝑖𝑟𝑒</m:t>
+                        </m:r>
+                      </m:sub>
+                    </m:sSub>
+                  </m:oMath>
+                </a14:m>
+                <a:endParaRPr lang="en-US" altLang="zh-TW" sz="1800" dirty="0">
+                  <a:latin typeface="+mj-lt"/>
+                </a:endParaRPr>
+              </a:p>
+              <a:p>
+                <a:pPr lvl="2">
+                  <a:lnSpc>
+                    <a:spcPct val="150000"/>
+                  </a:lnSpc>
+                </a:pPr>
+                <a14:m>
+                  <m:oMath xmlns:m="http://schemas.openxmlformats.org/officeDocument/2006/math">
+                    <m:sSub>
+                      <m:sSubPr>
+                        <m:ctrlPr>
+                          <a:rPr lang="en-US" altLang="zh-TW" sz="1600" i="1" smtClean="0">
+                            <a:latin typeface="Cambria Math" panose="02040503050406030204" pitchFamily="18" charset="0"/>
+                          </a:rPr>
+                        </m:ctrlPr>
+                      </m:sSubPr>
+                      <m:e>
+                        <m:r>
+                          <a:rPr lang="en-US" altLang="zh-TW" sz="1600" b="0" i="1" smtClean="0">
+                            <a:latin typeface="Cambria Math" panose="02040503050406030204" pitchFamily="18" charset="0"/>
+                          </a:rPr>
+                          <m:t>𝐼</m:t>
+                        </m:r>
+                      </m:e>
+                      <m:sub>
+                        <m:r>
+                          <a:rPr lang="en-US" altLang="zh-TW" sz="1600" b="0" i="1" smtClean="0">
+                            <a:latin typeface="Cambria Math" panose="02040503050406030204" pitchFamily="18" charset="0"/>
+                          </a:rPr>
+                          <m:t>𝑎𝑣𝑔</m:t>
+                        </m:r>
+                      </m:sub>
+                    </m:sSub>
+                    <m:r>
+                      <a:rPr lang="en-US" altLang="zh-TW" sz="1600" b="0" i="1" smtClean="0">
+                        <a:latin typeface="Cambria Math" panose="02040503050406030204" pitchFamily="18" charset="0"/>
+                      </a:rPr>
+                      <m:t>: </m:t>
+                    </m:r>
+                  </m:oMath>
+                </a14:m>
+                <a:r>
+                  <a:rPr lang="en-US" altLang="zh-TW" sz="1600" b="0" i="0" dirty="0">
+                    <a:latin typeface="+mj-lt"/>
+                  </a:rPr>
+                  <a:t>   The average current drawn from PDN under average switching rate.</a:t>
+                </a:r>
+              </a:p>
+              <a:p>
+                <a:pPr lvl="2">
+                  <a:lnSpc>
+                    <a:spcPct val="150000"/>
+                  </a:lnSpc>
+                </a:pPr>
+                <a14:m>
+                  <m:oMath xmlns:m="http://schemas.openxmlformats.org/officeDocument/2006/math">
+                    <m:sSub>
+                      <m:sSubPr>
+                        <m:ctrlPr>
+                          <a:rPr lang="en-US" altLang="zh-TW" sz="1600" i="1" smtClean="0">
+                            <a:latin typeface="Cambria Math" panose="02040503050406030204" pitchFamily="18" charset="0"/>
+                          </a:rPr>
+                        </m:ctrlPr>
+                      </m:sSubPr>
+                      <m:e>
+                        <m:r>
+                          <a:rPr lang="en-US" altLang="zh-TW" sz="1600" b="0" i="1" smtClean="0">
+                            <a:latin typeface="Cambria Math" panose="02040503050406030204" pitchFamily="18" charset="0"/>
+                          </a:rPr>
+                          <m:t>𝑅</m:t>
+                        </m:r>
+                      </m:e>
+                      <m:sub>
+                        <m:r>
+                          <a:rPr lang="en-US" altLang="zh-TW" sz="1600" b="0" i="1" smtClean="0">
+                            <a:latin typeface="Cambria Math" panose="02040503050406030204" pitchFamily="18" charset="0"/>
+                          </a:rPr>
+                          <m:t>𝑤𝑖𝑟𝑒</m:t>
+                        </m:r>
+                      </m:sub>
+                    </m:sSub>
+                    <m:r>
+                      <a:rPr lang="en-US" altLang="zh-TW" sz="1600" b="0" i="1" smtClean="0">
+                        <a:latin typeface="Cambria Math" panose="02040503050406030204" pitchFamily="18" charset="0"/>
+                      </a:rPr>
+                      <m:t>:</m:t>
+                    </m:r>
+                  </m:oMath>
+                </a14:m>
+                <a:r>
+                  <a:rPr lang="en-US" altLang="zh-TW" sz="1600" b="0" i="0" dirty="0">
+                    <a:latin typeface="+mj-lt"/>
+                  </a:rPr>
+                  <a:t>  E</a:t>
+                </a:r>
+                <a:r>
+                  <a:rPr lang="en-US" altLang="zh-TW" sz="1600" dirty="0">
+                    <a:latin typeface="+mj-lt"/>
+                  </a:rPr>
+                  <a:t>ffective resistance from the power source to the location of interest in the layout.</a:t>
+                </a:r>
+              </a:p>
+              <a:p>
+                <a:pPr>
+                  <a:lnSpc>
+                    <a:spcPct val="150000"/>
+                  </a:lnSpc>
+                </a:pPr>
+                <a:r>
+                  <a:rPr lang="en-US" altLang="zh-TW" sz="2200" dirty="0">
+                    <a:latin typeface="+mj-lt"/>
+                  </a:rPr>
+                  <a:t>Usually route power source and the secondary power pin of a cross-domain cell with wider metal</a:t>
+                </a:r>
+                <a:r>
+                  <a:rPr lang="zh-TW" altLang="en-US" sz="2200" dirty="0">
+                    <a:latin typeface="+mj-lt"/>
+                  </a:rPr>
+                  <a:t> </a:t>
+                </a:r>
+                <a:r>
+                  <a:rPr lang="en-US" altLang="zh-TW" sz="2200" dirty="0">
+                    <a:latin typeface="+mj-lt"/>
+                  </a:rPr>
+                  <a:t>than signal routing.</a:t>
+                </a:r>
+              </a:p>
+              <a:p>
+                <a:pPr lvl="1">
+                  <a:lnSpc>
+                    <a:spcPct val="150000"/>
+                  </a:lnSpc>
+                </a:pPr>
+                <a:r>
+                  <a:rPr lang="en-US" altLang="zh-TW" sz="1800" dirty="0">
+                    <a:latin typeface="+mj-lt"/>
+                  </a:rPr>
+                  <a:t>Encounter more severe IR drop issue.</a:t>
+                </a:r>
+              </a:p>
+              <a:p>
+                <a:pPr lvl="1">
+                  <a:lnSpc>
+                    <a:spcPct val="150000"/>
+                  </a:lnSpc>
+                </a:pPr>
+                <a:r>
+                  <a:rPr lang="en-US" altLang="zh-TW" sz="1800" dirty="0">
+                    <a:latin typeface="+mj-lt"/>
+                  </a:rPr>
+                  <a:t>Use sub-mesh reduce wire resistance and provide more via tapping location.</a:t>
+                </a:r>
+              </a:p>
+            </p:txBody>
+          </p:sp>
+        </mc:Choice>
+        <mc:Fallback xmlns="">
+          <p:sp>
+            <p:nvSpPr>
+              <p:cNvPr id="3" name="內容版面配置區 2">
+                <a:extLst>
+                  <a:ext uri="{FF2B5EF4-FFF2-40B4-BE49-F238E27FC236}">
+                    <a16:creationId xmlns:a16="http://schemas.microsoft.com/office/drawing/2014/main" id="{2BF1C42E-208D-D375-D779-4FE5706E52D6}"/>
+                  </a:ext>
+                </a:extLst>
+              </p:cNvPr>
+              <p:cNvSpPr>
+                <a:spLocks noGrp="1" noRot="1" noChangeAspect="1" noMove="1" noResize="1" noEditPoints="1" noAdjustHandles="1" noChangeArrowheads="1" noChangeShapeType="1" noTextEdit="1"/>
+              </p:cNvSpPr>
+              <p:nvPr>
+                <p:ph idx="1"/>
+              </p:nvPr>
+            </p:nvSpPr>
+            <p:spPr>
+              <a:xfrm>
+                <a:off x="838200" y="1620000"/>
+                <a:ext cx="10515600" cy="4895850"/>
+              </a:xfrm>
+              <a:blipFill>
+                <a:blip r:embed="rId3"/>
+                <a:stretch>
+                  <a:fillRect l="-696"/>
+                </a:stretch>
+              </a:blipFill>
+            </p:spPr>
+            <p:txBody>
+              <a:bodyPr/>
+              <a:lstStyle/>
+              <a:p>
+                <a:r>
+                  <a:rPr lang="zh-TW" altLang="en-US">
+                    <a:noFill/>
+                  </a:rPr>
+                  <a:t> </a:t>
+                </a:r>
+              </a:p>
+            </p:txBody>
+          </p:sp>
+        </mc:Fallback>
+      </mc:AlternateContent>
+      <p:sp>
+        <p:nvSpPr>
+          <p:cNvPr id="4" name="投影片編號版面配置區 3">
+            <a:extLst>
+              <a:ext uri="{FF2B5EF4-FFF2-40B4-BE49-F238E27FC236}">
+                <a16:creationId xmlns:a16="http://schemas.microsoft.com/office/drawing/2014/main" id="{75FE7E51-3153-478A-D8A4-7E30B3D4AF4C}"/>
+              </a:ext>
+            </a:extLst>
+          </p:cNvPr>
+          <p:cNvSpPr>
+            <a:spLocks noGrp="1"/>
+          </p:cNvSpPr>
+          <p:nvPr>
+            <p:ph type="sldNum" sz="quarter" idx="12"/>
+          </p:nvPr>
+        </p:nvSpPr>
+        <p:spPr/>
+        <p:txBody>
+          <a:bodyPr/>
+          <a:lstStyle/>
+          <a:p>
+            <a:fld id="{666274A1-CF9C-426A-8DD4-B13ED0C24231}" type="slidenum">
+              <a:rPr lang="en-US" smtClean="0"/>
+              <a:t>10</a:t>
+            </a:fld>
+            <a:endParaRPr lang="en-US"/>
           </a:p>
         </p:txBody>
       </p:sp>
       <p:pic>
         <p:nvPicPr>
-          <p:cNvPr id="6" name="內容版面配置區 5">
-            <a:extLst>
-              <a:ext uri="{FF2B5EF4-FFF2-40B4-BE49-F238E27FC236}">
-                <a16:creationId xmlns:a16="http://schemas.microsoft.com/office/drawing/2014/main" id="{FAFD1D33-569C-F65A-6431-0CC47395F37F}"/>
+          <p:cNvPr id="6" name="圖片 5">
+            <a:extLst>
+              <a:ext uri="{FF2B5EF4-FFF2-40B4-BE49-F238E27FC236}">
+                <a16:creationId xmlns:a16="http://schemas.microsoft.com/office/drawing/2014/main" id="{CE6AB594-E603-3F82-6564-C5CA8573E9C0}"/>
               </a:ext>
             </a:extLst>
           </p:cNvPr>
           <p:cNvPicPr>
-            <a:picLocks noGrp="1" noChangeAspect="1"/>
+            <a:picLocks noChangeAspect="1"/>
           </p:cNvPicPr>
-          <p:nvPr>
-            <p:ph idx="1"/>
-          </p:nvPr>
+          <p:nvPr/>
         </p:nvPicPr>
         <p:blipFill>
-          <a:blip r:embed="rId2"/>
+          <a:blip r:embed="rId4"/>
           <a:stretch>
             <a:fillRect/>
           </a:stretch>
         </p:blipFill>
         <p:spPr>
           <a:xfrm>
-            <a:off x="2860272" y="1575594"/>
-            <a:ext cx="6471455" cy="4895850"/>
+            <a:off x="6096000" y="136525"/>
+            <a:ext cx="5465894" cy="2103012"/>
           </a:xfrm>
+          <a:prstGeom prst="rect">
+            <a:avLst/>
+          </a:prstGeom>
         </p:spPr>
       </p:pic>
-      <p:sp>
-        <p:nvSpPr>
-          <p:cNvPr id="4" name="投影片編號版面配置區 3">
-            <a:extLst>
-              <a:ext uri="{FF2B5EF4-FFF2-40B4-BE49-F238E27FC236}">
-                <a16:creationId xmlns:a16="http://schemas.microsoft.com/office/drawing/2014/main" id="{E170D164-5E43-0D64-2651-D812DF971DF0}"/>
-              </a:ext>
-            </a:extLst>
-          </p:cNvPr>
-          <p:cNvSpPr>
-            <a:spLocks noGrp="1"/>
-          </p:cNvSpPr>
-          <p:nvPr>
-            <p:ph type="sldNum" sz="quarter" idx="12"/>
-          </p:nvPr>
-        </p:nvSpPr>
-        <p:spPr/>
-        <p:txBody>
-          <a:bodyPr/>
-          <a:lstStyle/>
-          <a:p>
-            <a:fld id="{666274A1-CF9C-426A-8DD4-B13ED0C24231}" type="slidenum">
-              <a:rPr lang="en-US" smtClean="0"/>
-              <a:t>10</a:t>
-            </a:fld>
-            <a:endParaRPr lang="en-US"/>
-          </a:p>
-        </p:txBody>
-      </p:sp>
     </p:spTree>
     <p:extLst>
       <p:ext uri="{BB962C8B-B14F-4D97-AF65-F5344CB8AC3E}">
-        <p14:creationId xmlns:p14="http://schemas.microsoft.com/office/powerpoint/2010/main" val="663736613"/>
+        <p14:creationId xmlns:p14="http://schemas.microsoft.com/office/powerpoint/2010/main" val="3284811820"/>
       </p:ext>
     </p:extLst>
   </p:cSld>
@@ -7133,7 +7634,7 @@
           <p:cNvPr id="2" name="標題 1">
             <a:extLst>
               <a:ext uri="{FF2B5EF4-FFF2-40B4-BE49-F238E27FC236}">
-                <a16:creationId xmlns:a16="http://schemas.microsoft.com/office/drawing/2014/main" id="{FD28F0D8-549F-0F5A-0929-4EE037E6D213}"/>
+                <a16:creationId xmlns:a16="http://schemas.microsoft.com/office/drawing/2014/main" id="{5286E359-E626-B493-ABAF-94D504ABD4C3}"/>
               </a:ext>
             </a:extLst>
           </p:cNvPr>
@@ -7151,15 +7652,7 @@
           <a:p>
             <a:r>
               <a:rPr lang="en-US" altLang="zh-TW" sz="4000" dirty="0"/>
-              <a:t>Methodology</a:t>
-            </a:r>
-            <a:r>
-              <a:rPr lang="en-US" altLang="zh-TW" dirty="0"/>
-              <a:t> </a:t>
-            </a:r>
-            <a:r>
-              <a:rPr lang="en-US" altLang="zh-TW" sz="2800" dirty="0"/>
-              <a:t>– Feature Extraction</a:t>
+              <a:t>Preliminaries</a:t>
             </a:r>
             <a:endParaRPr lang="zh-TW" altLang="en-US" dirty="0"/>
           </a:p>
@@ -7170,7 +7663,7 @@
           <p:cNvPr id="3" name="內容版面配置區 2">
             <a:extLst>
               <a:ext uri="{FF2B5EF4-FFF2-40B4-BE49-F238E27FC236}">
-                <a16:creationId xmlns:a16="http://schemas.microsoft.com/office/drawing/2014/main" id="{A631D7BD-9745-5DAE-5222-935ABF471125}"/>
+                <a16:creationId xmlns:a16="http://schemas.microsoft.com/office/drawing/2014/main" id="{64602112-5F7A-7122-5DB0-E3E666D8CB39}"/>
               </a:ext>
             </a:extLst>
           </p:cNvPr>
@@ -7181,66 +7674,86 @@
             <p:ph idx="1"/>
           </p:nvPr>
         </p:nvSpPr>
-        <p:spPr/>
-        <p:txBody>
-          <a:bodyPr>
-            <a:normAutofit/>
-          </a:bodyPr>
+        <p:spPr>
+          <a:xfrm>
+            <a:off x="838200" y="1690688"/>
+            <a:ext cx="10515600" cy="4486275"/>
+          </a:xfrm>
+        </p:spPr>
+        <p:txBody>
+          <a:bodyPr/>
           <a:lstStyle/>
           <a:p>
             <a:pPr>
               <a:lnSpc>
-                <a:spcPct val="125000"/>
+                <a:spcPct val="150000"/>
               </a:lnSpc>
             </a:pPr>
             <a:r>
               <a:rPr lang="en-US" altLang="zh-TW" sz="2200" dirty="0"/>
-              <a:t>Training layouts are generated by a multiple power domain design with different densities of sub-meshes.</a:t>
-            </a:r>
+              <a:t>Problem input</a:t>
+            </a:r>
+          </a:p>
+          <a:p>
+            <a:pPr lvl="1">
+              <a:lnSpc>
+                <a:spcPct val="150000"/>
+              </a:lnSpc>
+            </a:pPr>
+            <a:r>
+              <a:rPr lang="en-US" altLang="zh-TW" sz="1800" dirty="0"/>
+              <a:t>A timing-driven placed and clock-routed multiple power domain design.</a:t>
+            </a:r>
+          </a:p>
+          <a:p>
+            <a:pPr lvl="1">
+              <a:lnSpc>
+                <a:spcPct val="150000"/>
+              </a:lnSpc>
+            </a:pPr>
+            <a:r>
+              <a:rPr lang="en-US" altLang="zh-TW" sz="1800" dirty="0"/>
+              <a:t>A set of cross-domain cells and corresponding power sources, primary power mesh and signal routing distributions (</a:t>
+            </a:r>
+            <a:r>
+              <a:rPr lang="en-US" altLang="zh-TW" sz="1800"/>
+              <a:t>global routing).</a:t>
+            </a:r>
+            <a:endParaRPr lang="en-US" altLang="zh-TW" sz="1800" dirty="0"/>
           </a:p>
           <a:p>
             <a:pPr>
               <a:lnSpc>
-                <a:spcPct val="125000"/>
+                <a:spcPct val="150000"/>
               </a:lnSpc>
             </a:pPr>
             <a:r>
               <a:rPr lang="en-US" altLang="zh-TW" sz="2200" dirty="0"/>
-              <a:t>The training layout is partitioned into uniform grids.</a:t>
-            </a:r>
-          </a:p>
-          <a:p>
-            <a:pPr>
+              <a:t>Goal</a:t>
+            </a:r>
+          </a:p>
+          <a:p>
+            <a:pPr lvl="1">
               <a:lnSpc>
-                <a:spcPct val="125000"/>
+                <a:spcPct val="150000"/>
               </a:lnSpc>
             </a:pPr>
             <a:r>
-              <a:rPr lang="en-US" altLang="zh-TW" sz="2200" dirty="0"/>
-              <a:t>The datasets contain around 20K cross-domain cell instances</a:t>
+              <a:rPr lang="en-US" altLang="zh-TW" sz="1800" dirty="0"/>
+              <a:t>To construct power sub-meshes such that the IR drop constraints on cross-domain cells are satisfied.</a:t>
             </a:r>
           </a:p>
           <a:p>
             <a:pPr lvl="1">
               <a:lnSpc>
-                <a:spcPct val="125000"/>
+                <a:spcPct val="150000"/>
               </a:lnSpc>
             </a:pPr>
             <a:r>
               <a:rPr lang="en-US" altLang="zh-TW" sz="1800" dirty="0"/>
-              <a:t>Split them into training and validation sets with 80 : 20 split ratio.</a:t>
-            </a:r>
-          </a:p>
-          <a:p>
-            <a:pPr lvl="1">
-              <a:lnSpc>
-                <a:spcPct val="125000"/>
-              </a:lnSpc>
-            </a:pPr>
-            <a:r>
-              <a:rPr lang="en-US" altLang="zh-TW" sz="1800" dirty="0"/>
-              <a:t>Perform normalization and standardization on the data feature values before the training process</a:t>
-            </a:r>
+              <a:t>Design rule violations on signal routing are minimized without timing degradation.</a:t>
+            </a:r>
+            <a:endParaRPr lang="zh-TW" altLang="en-US" sz="1800" dirty="0"/>
           </a:p>
         </p:txBody>
       </p:sp>
@@ -7249,7 +7762,7 @@
           <p:cNvPr id="4" name="投影片編號版面配置區 3">
             <a:extLst>
               <a:ext uri="{FF2B5EF4-FFF2-40B4-BE49-F238E27FC236}">
-                <a16:creationId xmlns:a16="http://schemas.microsoft.com/office/drawing/2014/main" id="{29205F26-7060-16BC-949B-03B5E192AEFC}"/>
+                <a16:creationId xmlns:a16="http://schemas.microsoft.com/office/drawing/2014/main" id="{BEB3191F-3D5D-B9EF-1EDE-CD891F6DB1AD}"/>
               </a:ext>
             </a:extLst>
           </p:cNvPr>
@@ -7276,7 +7789,7 @@
     </p:spTree>
     <p:extLst>
       <p:ext uri="{BB962C8B-B14F-4D97-AF65-F5344CB8AC3E}">
-        <p14:creationId xmlns:p14="http://schemas.microsoft.com/office/powerpoint/2010/main" val="2703942916"/>
+        <p14:creationId xmlns:p14="http://schemas.microsoft.com/office/powerpoint/2010/main" val="3031697280"/>
       </p:ext>
     </p:extLst>
   </p:cSld>
@@ -7305,6 +7818,510 @@
       </p:grpSpPr>
       <p:sp>
         <p:nvSpPr>
+          <p:cNvPr id="2" name="標題 1">
+            <a:extLst>
+              <a:ext uri="{FF2B5EF4-FFF2-40B4-BE49-F238E27FC236}">
+                <a16:creationId xmlns:a16="http://schemas.microsoft.com/office/drawing/2014/main" id="{F95E0C03-DA09-BCA5-440A-A05C34D99715}"/>
+              </a:ext>
+            </a:extLst>
+          </p:cNvPr>
+          <p:cNvSpPr>
+            <a:spLocks noGrp="1"/>
+          </p:cNvSpPr>
+          <p:nvPr>
+            <p:ph type="title"/>
+          </p:nvPr>
+        </p:nvSpPr>
+        <p:spPr/>
+        <p:txBody>
+          <a:bodyPr/>
+          <a:lstStyle/>
+          <a:p>
+            <a:r>
+              <a:rPr lang="en-US" altLang="zh-TW" sz="4000" dirty="0">
+                <a:latin typeface="Times" panose="02020603050405020304" pitchFamily="18" charset="0"/>
+                <a:cs typeface="Times" panose="02020603050405020304" pitchFamily="18" charset="0"/>
+              </a:rPr>
+              <a:t>Outline</a:t>
+            </a:r>
+            <a:endParaRPr lang="zh-TW" altLang="en-US" dirty="0">
+              <a:latin typeface="Times" panose="02020603050405020304" pitchFamily="18" charset="0"/>
+              <a:cs typeface="Times" panose="02020603050405020304" pitchFamily="18" charset="0"/>
+            </a:endParaRPr>
+          </a:p>
+        </p:txBody>
+      </p:sp>
+      <p:sp>
+        <p:nvSpPr>
+          <p:cNvPr id="3" name="內容版面配置區 2">
+            <a:extLst>
+              <a:ext uri="{FF2B5EF4-FFF2-40B4-BE49-F238E27FC236}">
+                <a16:creationId xmlns:a16="http://schemas.microsoft.com/office/drawing/2014/main" id="{F671C038-AE51-E136-6B1E-6C38BF235BBE}"/>
+              </a:ext>
+            </a:extLst>
+          </p:cNvPr>
+          <p:cNvSpPr>
+            <a:spLocks noGrp="1"/>
+          </p:cNvSpPr>
+          <p:nvPr>
+            <p:ph idx="1"/>
+          </p:nvPr>
+        </p:nvSpPr>
+        <p:spPr bwMode="auto">
+          <a:xfrm>
+            <a:off x="838200" y="1620000"/>
+            <a:ext cx="10515600" cy="4351338"/>
+          </a:xfrm>
+        </p:spPr>
+        <p:txBody>
+          <a:bodyPr>
+            <a:normAutofit/>
+          </a:bodyPr>
+          <a:lstStyle/>
+          <a:p>
+            <a:pPr>
+              <a:lnSpc>
+                <a:spcPct val="150000"/>
+              </a:lnSpc>
+            </a:pPr>
+            <a:r>
+              <a:rPr lang="en-US" altLang="zh-TW" sz="2400" dirty="0">
+                <a:solidFill>
+                  <a:schemeClr val="bg1">
+                    <a:lumMod val="65000"/>
+                  </a:schemeClr>
+                </a:solidFill>
+              </a:rPr>
+              <a:t>Introduction</a:t>
+            </a:r>
+          </a:p>
+          <a:p>
+            <a:pPr>
+              <a:lnSpc>
+                <a:spcPct val="150000"/>
+              </a:lnSpc>
+            </a:pPr>
+            <a:r>
+              <a:rPr lang="en-US" altLang="zh-TW" sz="2400" dirty="0">
+                <a:solidFill>
+                  <a:schemeClr val="bg1">
+                    <a:lumMod val="65000"/>
+                  </a:schemeClr>
+                </a:solidFill>
+              </a:rPr>
+              <a:t>Preliminaries</a:t>
+            </a:r>
+          </a:p>
+          <a:p>
+            <a:pPr>
+              <a:lnSpc>
+                <a:spcPct val="150000"/>
+              </a:lnSpc>
+            </a:pPr>
+            <a:r>
+              <a:rPr lang="en-US" altLang="zh-TW" sz="2400" dirty="0"/>
+              <a:t>Methodology</a:t>
+            </a:r>
+          </a:p>
+          <a:p>
+            <a:pPr>
+              <a:lnSpc>
+                <a:spcPct val="150000"/>
+              </a:lnSpc>
+            </a:pPr>
+            <a:r>
+              <a:rPr lang="en-US" altLang="zh-TW" sz="2400" dirty="0">
+                <a:solidFill>
+                  <a:schemeClr val="bg1">
+                    <a:lumMod val="65000"/>
+                  </a:schemeClr>
+                </a:solidFill>
+              </a:rPr>
+              <a:t>Experimental</a:t>
+            </a:r>
+            <a:r>
+              <a:rPr lang="en-US" altLang="zh-TW" dirty="0">
+                <a:solidFill>
+                  <a:schemeClr val="bg1">
+                    <a:lumMod val="65000"/>
+                  </a:schemeClr>
+                </a:solidFill>
+              </a:rPr>
+              <a:t> </a:t>
+            </a:r>
+            <a:r>
+              <a:rPr lang="en-US" altLang="zh-TW" sz="2400" dirty="0">
+                <a:solidFill>
+                  <a:schemeClr val="bg1">
+                    <a:lumMod val="65000"/>
+                  </a:schemeClr>
+                </a:solidFill>
+              </a:rPr>
+              <a:t>Results</a:t>
+            </a:r>
+            <a:endParaRPr lang="zh-TW" altLang="en-US" dirty="0">
+              <a:solidFill>
+                <a:schemeClr val="bg1">
+                  <a:lumMod val="65000"/>
+                </a:schemeClr>
+              </a:solidFill>
+            </a:endParaRPr>
+          </a:p>
+        </p:txBody>
+      </p:sp>
+      <p:sp>
+        <p:nvSpPr>
+          <p:cNvPr id="4" name="投影片編號版面配置區 3">
+            <a:extLst>
+              <a:ext uri="{FF2B5EF4-FFF2-40B4-BE49-F238E27FC236}">
+                <a16:creationId xmlns:a16="http://schemas.microsoft.com/office/drawing/2014/main" id="{5891B803-9796-C957-1032-D2F5DFAFFD47}"/>
+              </a:ext>
+            </a:extLst>
+          </p:cNvPr>
+          <p:cNvSpPr>
+            <a:spLocks noGrp="1"/>
+          </p:cNvSpPr>
+          <p:nvPr>
+            <p:ph type="sldNum" sz="quarter" idx="12"/>
+          </p:nvPr>
+        </p:nvSpPr>
+        <p:spPr/>
+        <p:txBody>
+          <a:bodyPr/>
+          <a:lstStyle/>
+          <a:p>
+            <a:fld id="{666274A1-CF9C-426A-8DD4-B13ED0C24231}" type="slidenum">
+              <a:rPr lang="en-US" smtClean="0"/>
+              <a:t>12</a:t>
+            </a:fld>
+            <a:endParaRPr lang="en-US"/>
+          </a:p>
+        </p:txBody>
+      </p:sp>
+    </p:spTree>
+    <p:extLst>
+      <p:ext uri="{BB962C8B-B14F-4D97-AF65-F5344CB8AC3E}">
+        <p14:creationId xmlns:p14="http://schemas.microsoft.com/office/powerpoint/2010/main" val="3410730265"/>
+      </p:ext>
+    </p:extLst>
+  </p:cSld>
+  <p:clrMapOvr>
+    <a:masterClrMapping/>
+  </p:clrMapOvr>
+</p:sld>
+</file>
+
+<file path=ppt/slides/slide14.xml><?xml version="1.0" encoding="utf-8"?>
+<p:sld xmlns:a="http://schemas.openxmlformats.org/drawingml/2006/main" xmlns:r="http://schemas.openxmlformats.org/officeDocument/2006/relationships" xmlns:p="http://schemas.openxmlformats.org/presentationml/2006/main">
+  <p:cSld>
+    <p:spTree>
+      <p:nvGrpSpPr>
+        <p:cNvPr id="1" name=""/>
+        <p:cNvGrpSpPr/>
+        <p:nvPr/>
+      </p:nvGrpSpPr>
+      <p:grpSpPr>
+        <a:xfrm>
+          <a:off x="0" y="0"/>
+          <a:ext cx="0" cy="0"/>
+          <a:chOff x="0" y="0"/>
+          <a:chExt cx="0" cy="0"/>
+        </a:xfrm>
+      </p:grpSpPr>
+      <p:sp>
+        <p:nvSpPr>
+          <p:cNvPr id="2" name="標題 1">
+            <a:extLst>
+              <a:ext uri="{FF2B5EF4-FFF2-40B4-BE49-F238E27FC236}">
+                <a16:creationId xmlns:a16="http://schemas.microsoft.com/office/drawing/2014/main" id="{27366C51-2F74-B127-3481-5D12174C21C1}"/>
+              </a:ext>
+            </a:extLst>
+          </p:cNvPr>
+          <p:cNvSpPr>
+            <a:spLocks noGrp="1"/>
+          </p:cNvSpPr>
+          <p:nvPr>
+            <p:ph type="title"/>
+          </p:nvPr>
+        </p:nvSpPr>
+        <p:spPr/>
+        <p:txBody>
+          <a:bodyPr/>
+          <a:lstStyle/>
+          <a:p>
+            <a:r>
+              <a:rPr lang="en-US" altLang="zh-TW" sz="4000" dirty="0"/>
+              <a:t>Methodology</a:t>
+            </a:r>
+            <a:endParaRPr lang="zh-TW" altLang="en-US" dirty="0"/>
+          </a:p>
+        </p:txBody>
+      </p:sp>
+      <p:pic>
+        <p:nvPicPr>
+          <p:cNvPr id="6" name="內容版面配置區 5">
+            <a:extLst>
+              <a:ext uri="{FF2B5EF4-FFF2-40B4-BE49-F238E27FC236}">
+                <a16:creationId xmlns:a16="http://schemas.microsoft.com/office/drawing/2014/main" id="{FAFD1D33-569C-F65A-6431-0CC47395F37F}"/>
+              </a:ext>
+            </a:extLst>
+          </p:cNvPr>
+          <p:cNvPicPr>
+            <a:picLocks noGrp="1" noChangeAspect="1"/>
+          </p:cNvPicPr>
+          <p:nvPr>
+            <p:ph idx="1"/>
+          </p:nvPr>
+        </p:nvPicPr>
+        <p:blipFill>
+          <a:blip r:embed="rId2"/>
+          <a:stretch>
+            <a:fillRect/>
+          </a:stretch>
+        </p:blipFill>
+        <p:spPr>
+          <a:xfrm>
+            <a:off x="2860272" y="1575594"/>
+            <a:ext cx="6471455" cy="4895850"/>
+          </a:xfrm>
+        </p:spPr>
+      </p:pic>
+      <p:sp>
+        <p:nvSpPr>
+          <p:cNvPr id="4" name="投影片編號版面配置區 3">
+            <a:extLst>
+              <a:ext uri="{FF2B5EF4-FFF2-40B4-BE49-F238E27FC236}">
+                <a16:creationId xmlns:a16="http://schemas.microsoft.com/office/drawing/2014/main" id="{E170D164-5E43-0D64-2651-D812DF971DF0}"/>
+              </a:ext>
+            </a:extLst>
+          </p:cNvPr>
+          <p:cNvSpPr>
+            <a:spLocks noGrp="1"/>
+          </p:cNvSpPr>
+          <p:nvPr>
+            <p:ph type="sldNum" sz="quarter" idx="12"/>
+          </p:nvPr>
+        </p:nvSpPr>
+        <p:spPr/>
+        <p:txBody>
+          <a:bodyPr/>
+          <a:lstStyle/>
+          <a:p>
+            <a:fld id="{666274A1-CF9C-426A-8DD4-B13ED0C24231}" type="slidenum">
+              <a:rPr lang="en-US" smtClean="0"/>
+              <a:t>13</a:t>
+            </a:fld>
+            <a:endParaRPr lang="en-US"/>
+          </a:p>
+        </p:txBody>
+      </p:sp>
+    </p:spTree>
+    <p:extLst>
+      <p:ext uri="{BB962C8B-B14F-4D97-AF65-F5344CB8AC3E}">
+        <p14:creationId xmlns:p14="http://schemas.microsoft.com/office/powerpoint/2010/main" val="663736613"/>
+      </p:ext>
+    </p:extLst>
+  </p:cSld>
+  <p:clrMapOvr>
+    <a:masterClrMapping/>
+  </p:clrMapOvr>
+</p:sld>
+</file>
+
+<file path=ppt/slides/slide15.xml><?xml version="1.0" encoding="utf-8"?>
+<p:sld xmlns:a="http://schemas.openxmlformats.org/drawingml/2006/main" xmlns:r="http://schemas.openxmlformats.org/officeDocument/2006/relationships" xmlns:p="http://schemas.openxmlformats.org/presentationml/2006/main">
+  <p:cSld>
+    <p:spTree>
+      <p:nvGrpSpPr>
+        <p:cNvPr id="1" name=""/>
+        <p:cNvGrpSpPr/>
+        <p:nvPr/>
+      </p:nvGrpSpPr>
+      <p:grpSpPr>
+        <a:xfrm>
+          <a:off x="0" y="0"/>
+          <a:ext cx="0" cy="0"/>
+          <a:chOff x="0" y="0"/>
+          <a:chExt cx="0" cy="0"/>
+        </a:xfrm>
+      </p:grpSpPr>
+      <p:sp>
+        <p:nvSpPr>
+          <p:cNvPr id="2" name="標題 1">
+            <a:extLst>
+              <a:ext uri="{FF2B5EF4-FFF2-40B4-BE49-F238E27FC236}">
+                <a16:creationId xmlns:a16="http://schemas.microsoft.com/office/drawing/2014/main" id="{FD28F0D8-549F-0F5A-0929-4EE037E6D213}"/>
+              </a:ext>
+            </a:extLst>
+          </p:cNvPr>
+          <p:cNvSpPr>
+            <a:spLocks noGrp="1"/>
+          </p:cNvSpPr>
+          <p:nvPr>
+            <p:ph type="title"/>
+          </p:nvPr>
+        </p:nvSpPr>
+        <p:spPr/>
+        <p:txBody>
+          <a:bodyPr/>
+          <a:lstStyle/>
+          <a:p>
+            <a:r>
+              <a:rPr lang="en-US" altLang="zh-TW" sz="4000" dirty="0"/>
+              <a:t>Methodology</a:t>
+            </a:r>
+            <a:r>
+              <a:rPr lang="en-US" altLang="zh-TW" dirty="0"/>
+              <a:t> </a:t>
+            </a:r>
+            <a:r>
+              <a:rPr lang="en-US" altLang="zh-TW" sz="2800" dirty="0"/>
+              <a:t>– Feature Extraction</a:t>
+            </a:r>
+            <a:endParaRPr lang="zh-TW" altLang="en-US" dirty="0"/>
+          </a:p>
+        </p:txBody>
+      </p:sp>
+      <p:sp>
+        <p:nvSpPr>
+          <p:cNvPr id="3" name="內容版面配置區 2">
+            <a:extLst>
+              <a:ext uri="{FF2B5EF4-FFF2-40B4-BE49-F238E27FC236}">
+                <a16:creationId xmlns:a16="http://schemas.microsoft.com/office/drawing/2014/main" id="{A631D7BD-9745-5DAE-5222-935ABF471125}"/>
+              </a:ext>
+            </a:extLst>
+          </p:cNvPr>
+          <p:cNvSpPr>
+            <a:spLocks noGrp="1"/>
+          </p:cNvSpPr>
+          <p:nvPr>
+            <p:ph idx="1"/>
+          </p:nvPr>
+        </p:nvSpPr>
+        <p:spPr/>
+        <p:txBody>
+          <a:bodyPr>
+            <a:normAutofit/>
+          </a:bodyPr>
+          <a:lstStyle/>
+          <a:p>
+            <a:pPr>
+              <a:lnSpc>
+                <a:spcPct val="125000"/>
+              </a:lnSpc>
+            </a:pPr>
+            <a:r>
+              <a:rPr lang="en-US" altLang="zh-TW" sz="2200" dirty="0"/>
+              <a:t>Training layouts are generated by a multiple power domain design with different densities of sub-meshes.</a:t>
+            </a:r>
+          </a:p>
+          <a:p>
+            <a:pPr>
+              <a:lnSpc>
+                <a:spcPct val="125000"/>
+              </a:lnSpc>
+            </a:pPr>
+            <a:r>
+              <a:rPr lang="en-US" altLang="zh-TW" sz="2200" dirty="0"/>
+              <a:t>The training layout is partitioned into uniform grids.</a:t>
+            </a:r>
+          </a:p>
+          <a:p>
+            <a:pPr>
+              <a:lnSpc>
+                <a:spcPct val="125000"/>
+              </a:lnSpc>
+            </a:pPr>
+            <a:r>
+              <a:rPr lang="en-US" altLang="zh-TW" sz="2200" dirty="0"/>
+              <a:t>The datasets contain around 20K cross-domain cell instances</a:t>
+            </a:r>
+          </a:p>
+          <a:p>
+            <a:pPr lvl="1">
+              <a:lnSpc>
+                <a:spcPct val="125000"/>
+              </a:lnSpc>
+            </a:pPr>
+            <a:r>
+              <a:rPr lang="en-US" altLang="zh-TW" sz="1800" dirty="0"/>
+              <a:t>Split them into training and validation sets with 80 : 20 split ratio.</a:t>
+            </a:r>
+          </a:p>
+          <a:p>
+            <a:pPr lvl="1">
+              <a:lnSpc>
+                <a:spcPct val="125000"/>
+              </a:lnSpc>
+            </a:pPr>
+            <a:r>
+              <a:rPr lang="en-US" altLang="zh-TW" sz="1800" dirty="0"/>
+              <a:t>Perform normalization and standardization on the data feature values before the training process</a:t>
+            </a:r>
+          </a:p>
+        </p:txBody>
+      </p:sp>
+      <p:sp>
+        <p:nvSpPr>
+          <p:cNvPr id="4" name="投影片編號版面配置區 3">
+            <a:extLst>
+              <a:ext uri="{FF2B5EF4-FFF2-40B4-BE49-F238E27FC236}">
+                <a16:creationId xmlns:a16="http://schemas.microsoft.com/office/drawing/2014/main" id="{29205F26-7060-16BC-949B-03B5E192AEFC}"/>
+              </a:ext>
+            </a:extLst>
+          </p:cNvPr>
+          <p:cNvSpPr>
+            <a:spLocks noGrp="1"/>
+          </p:cNvSpPr>
+          <p:nvPr>
+            <p:ph type="sldNum" sz="quarter" idx="12"/>
+          </p:nvPr>
+        </p:nvSpPr>
+        <p:spPr/>
+        <p:txBody>
+          <a:bodyPr/>
+          <a:lstStyle/>
+          <a:p>
+            <a:fld id="{666274A1-CF9C-426A-8DD4-B13ED0C24231}" type="slidenum">
+              <a:rPr lang="en-US" smtClean="0"/>
+              <a:t>14</a:t>
+            </a:fld>
+            <a:endParaRPr lang="en-US"/>
+          </a:p>
+        </p:txBody>
+      </p:sp>
+    </p:spTree>
+    <p:extLst>
+      <p:ext uri="{BB962C8B-B14F-4D97-AF65-F5344CB8AC3E}">
+        <p14:creationId xmlns:p14="http://schemas.microsoft.com/office/powerpoint/2010/main" val="2703942916"/>
+      </p:ext>
+    </p:extLst>
+  </p:cSld>
+  <p:clrMapOvr>
+    <a:masterClrMapping/>
+  </p:clrMapOvr>
+</p:sld>
+</file>
+
+<file path=ppt/slides/slide16.xml><?xml version="1.0" encoding="utf-8"?>
+<p:sld xmlns:a="http://schemas.openxmlformats.org/drawingml/2006/main" xmlns:r="http://schemas.openxmlformats.org/officeDocument/2006/relationships" xmlns:p="http://schemas.openxmlformats.org/presentationml/2006/main">
+  <p:cSld>
+    <p:spTree>
+      <p:nvGrpSpPr>
+        <p:cNvPr id="1" name=""/>
+        <p:cNvGrpSpPr/>
+        <p:nvPr/>
+      </p:nvGrpSpPr>
+      <p:grpSpPr>
+        <a:xfrm>
+          <a:off x="0" y="0"/>
+          <a:ext cx="0" cy="0"/>
+          <a:chOff x="0" y="0"/>
+          <a:chExt cx="0" cy="0"/>
+        </a:xfrm>
+      </p:grpSpPr>
+      <p:sp>
+        <p:nvSpPr>
           <p:cNvPr id="3" name="內容版面配置區 2">
             <a:extLst>
               <a:ext uri="{FF2B5EF4-FFF2-40B4-BE49-F238E27FC236}">
@@ -7362,7 +8379,7 @@
           <a:p>
             <a:fld id="{666274A1-CF9C-426A-8DD4-B13ED0C24231}" type="slidenum">
               <a:rPr lang="en-US" smtClean="0"/>
-              <a:t>12</a:t>
+              <a:t>15</a:t>
             </a:fld>
             <a:endParaRPr lang="en-US"/>
           </a:p>
@@ -8304,7 +9321,7 @@
             </a:pPr>
             <a:r>
               <a:rPr lang="en-US" altLang="zh-TW" sz="1600" dirty="0"/>
-              <a:t>the static IR drop value of each cross-domain cell (with direct or indirect supply) reported by the IR drop simulation tool</a:t>
+              <a:t>The static IR drop value of each cross-domain cell (with direct or indirect supply) reported by the IR drop simulation tool</a:t>
             </a:r>
           </a:p>
           <a:p>
@@ -8336,7 +9353,7 @@
 </p:sld>
 </file>
 
-<file path=ppt/slides/slide14.xml><?xml version="1.0" encoding="utf-8"?>
+<file path=ppt/slides/slide17.xml><?xml version="1.0" encoding="utf-8"?>
 <p:sld xmlns:a="http://schemas.openxmlformats.org/drawingml/2006/main" xmlns:r="http://schemas.openxmlformats.org/officeDocument/2006/relationships" xmlns:p="http://schemas.openxmlformats.org/presentationml/2006/main">
   <p:cSld>
     <p:spTree>
@@ -8742,7 +9759,7 @@
           <a:p>
             <a:fld id="{666274A1-CF9C-426A-8DD4-B13ED0C24231}" type="slidenum">
               <a:rPr lang="en-US" smtClean="0"/>
-              <a:t>13</a:t>
+              <a:t>16</a:t>
             </a:fld>
             <a:endParaRPr lang="en-US"/>
           </a:p>
@@ -8821,7 +9838,7 @@
 </p:sld>
 </file>
 
-<file path=ppt/slides/slide15.xml><?xml version="1.0" encoding="utf-8"?>
+<file path=ppt/slides/slide18.xml><?xml version="1.0" encoding="utf-8"?>
 <p:sld xmlns:a="http://schemas.openxmlformats.org/drawingml/2006/main" xmlns:r="http://schemas.openxmlformats.org/officeDocument/2006/relationships" xmlns:p="http://schemas.openxmlformats.org/presentationml/2006/main">
   <p:cSld>
     <p:spTree>
@@ -9003,7 +10020,7 @@
           <a:p>
             <a:fld id="{666274A1-CF9C-426A-8DD4-B13ED0C24231}" type="slidenum">
               <a:rPr lang="en-US" smtClean="0"/>
-              <a:t>14</a:t>
+              <a:t>17</a:t>
             </a:fld>
             <a:endParaRPr lang="en-US"/>
           </a:p>
@@ -9126,7 +10143,7 @@
 </p:sld>
 </file>
 
-<file path=ppt/slides/slide16.xml><?xml version="1.0" encoding="utf-8"?>
+<file path=ppt/slides/slide19.xml><?xml version="1.0" encoding="utf-8"?>
 <p:sld xmlns:a="http://schemas.openxmlformats.org/drawingml/2006/main" xmlns:r="http://schemas.openxmlformats.org/officeDocument/2006/relationships" xmlns:p="http://schemas.openxmlformats.org/presentationml/2006/main">
   <p:cSld>
     <p:spTree>
@@ -9203,7 +10220,7 @@
           <a:p>
             <a:fld id="{666274A1-CF9C-426A-8DD4-B13ED0C24231}" type="slidenum">
               <a:rPr lang="en-US" smtClean="0"/>
-              <a:t>15</a:t>
+              <a:t>18</a:t>
             </a:fld>
             <a:endParaRPr lang="en-US"/>
           </a:p>
@@ -9277,7 +10294,7 @@
 </p:sld>
 </file>
 
-<file path=ppt/slides/slide17.xml><?xml version="1.0" encoding="utf-8"?>
+<file path=ppt/slides/slide2.xml><?xml version="1.0" encoding="utf-8"?>
 <p:sld xmlns:a="http://schemas.openxmlformats.org/drawingml/2006/main" xmlns:r="http://schemas.openxmlformats.org/officeDocument/2006/relationships" xmlns:p="http://schemas.openxmlformats.org/presentationml/2006/main">
   <p:cSld>
     <p:spTree>
@@ -9299,6 +10316,182 @@
           <p:cNvPr id="2" name="標題 1">
             <a:extLst>
               <a:ext uri="{FF2B5EF4-FFF2-40B4-BE49-F238E27FC236}">
+                <a16:creationId xmlns:a16="http://schemas.microsoft.com/office/drawing/2014/main" id="{F95E0C03-DA09-BCA5-440A-A05C34D99715}"/>
+              </a:ext>
+            </a:extLst>
+          </p:cNvPr>
+          <p:cNvSpPr>
+            <a:spLocks noGrp="1"/>
+          </p:cNvSpPr>
+          <p:nvPr>
+            <p:ph type="title"/>
+          </p:nvPr>
+        </p:nvSpPr>
+        <p:spPr/>
+        <p:txBody>
+          <a:bodyPr/>
+          <a:lstStyle/>
+          <a:p>
+            <a:r>
+              <a:rPr lang="en-US" altLang="zh-TW" sz="4000" dirty="0">
+                <a:latin typeface="Times" panose="02020603050405020304" pitchFamily="18" charset="0"/>
+                <a:cs typeface="Times" panose="02020603050405020304" pitchFamily="18" charset="0"/>
+              </a:rPr>
+              <a:t>Outline</a:t>
+            </a:r>
+            <a:endParaRPr lang="zh-TW" altLang="en-US" dirty="0">
+              <a:latin typeface="Times" panose="02020603050405020304" pitchFamily="18" charset="0"/>
+              <a:cs typeface="Times" panose="02020603050405020304" pitchFamily="18" charset="0"/>
+            </a:endParaRPr>
+          </a:p>
+        </p:txBody>
+      </p:sp>
+      <p:sp>
+        <p:nvSpPr>
+          <p:cNvPr id="3" name="內容版面配置區 2">
+            <a:extLst>
+              <a:ext uri="{FF2B5EF4-FFF2-40B4-BE49-F238E27FC236}">
+                <a16:creationId xmlns:a16="http://schemas.microsoft.com/office/drawing/2014/main" id="{F671C038-AE51-E136-6B1E-6C38BF235BBE}"/>
+              </a:ext>
+            </a:extLst>
+          </p:cNvPr>
+          <p:cNvSpPr>
+            <a:spLocks noGrp="1"/>
+          </p:cNvSpPr>
+          <p:nvPr>
+            <p:ph idx="1"/>
+          </p:nvPr>
+        </p:nvSpPr>
+        <p:spPr bwMode="auto">
+          <a:xfrm>
+            <a:off x="838200" y="1620000"/>
+            <a:ext cx="10515600" cy="4351338"/>
+          </a:xfrm>
+        </p:spPr>
+        <p:txBody>
+          <a:bodyPr>
+            <a:normAutofit/>
+          </a:bodyPr>
+          <a:lstStyle/>
+          <a:p>
+            <a:pPr>
+              <a:lnSpc>
+                <a:spcPct val="150000"/>
+              </a:lnSpc>
+            </a:pPr>
+            <a:r>
+              <a:rPr lang="en-US" altLang="zh-TW" sz="2400" dirty="0"/>
+              <a:t>Introduction</a:t>
+            </a:r>
+          </a:p>
+          <a:p>
+            <a:pPr>
+              <a:lnSpc>
+                <a:spcPct val="150000"/>
+              </a:lnSpc>
+            </a:pPr>
+            <a:r>
+              <a:rPr lang="en-US" altLang="zh-TW" sz="2400" dirty="0"/>
+              <a:t>Preliminaries</a:t>
+            </a:r>
+          </a:p>
+          <a:p>
+            <a:pPr>
+              <a:lnSpc>
+                <a:spcPct val="150000"/>
+              </a:lnSpc>
+            </a:pPr>
+            <a:r>
+              <a:rPr lang="en-US" altLang="zh-TW" sz="2400" dirty="0"/>
+              <a:t>Methodology</a:t>
+            </a:r>
+          </a:p>
+          <a:p>
+            <a:pPr>
+              <a:lnSpc>
+                <a:spcPct val="150000"/>
+              </a:lnSpc>
+            </a:pPr>
+            <a:r>
+              <a:rPr lang="en-US" altLang="zh-TW" sz="2400" dirty="0"/>
+              <a:t>Experimental</a:t>
+            </a:r>
+            <a:r>
+              <a:rPr lang="en-US" altLang="zh-TW" dirty="0"/>
+              <a:t> </a:t>
+            </a:r>
+            <a:r>
+              <a:rPr lang="en-US" altLang="zh-TW" sz="2400" dirty="0"/>
+              <a:t>Results</a:t>
+            </a:r>
+            <a:endParaRPr lang="zh-TW" altLang="en-US" dirty="0"/>
+          </a:p>
+        </p:txBody>
+      </p:sp>
+      <p:sp>
+        <p:nvSpPr>
+          <p:cNvPr id="4" name="投影片編號版面配置區 3">
+            <a:extLst>
+              <a:ext uri="{FF2B5EF4-FFF2-40B4-BE49-F238E27FC236}">
+                <a16:creationId xmlns:a16="http://schemas.microsoft.com/office/drawing/2014/main" id="{5891B803-9796-C957-1032-D2F5DFAFFD47}"/>
+              </a:ext>
+            </a:extLst>
+          </p:cNvPr>
+          <p:cNvSpPr>
+            <a:spLocks noGrp="1"/>
+          </p:cNvSpPr>
+          <p:nvPr>
+            <p:ph type="sldNum" sz="quarter" idx="12"/>
+          </p:nvPr>
+        </p:nvSpPr>
+        <p:spPr/>
+        <p:txBody>
+          <a:bodyPr/>
+          <a:lstStyle/>
+          <a:p>
+            <a:fld id="{666274A1-CF9C-426A-8DD4-B13ED0C24231}" type="slidenum">
+              <a:rPr lang="en-US" smtClean="0"/>
+              <a:t>1</a:t>
+            </a:fld>
+            <a:endParaRPr lang="en-US"/>
+          </a:p>
+        </p:txBody>
+      </p:sp>
+    </p:spTree>
+    <p:extLst>
+      <p:ext uri="{BB962C8B-B14F-4D97-AF65-F5344CB8AC3E}">
+        <p14:creationId xmlns:p14="http://schemas.microsoft.com/office/powerpoint/2010/main" val="701454037"/>
+      </p:ext>
+    </p:extLst>
+  </p:cSld>
+  <p:clrMapOvr>
+    <a:masterClrMapping/>
+  </p:clrMapOvr>
+</p:sld>
+</file>
+
+<file path=ppt/slides/slide20.xml><?xml version="1.0" encoding="utf-8"?>
+<p:sld xmlns:a="http://schemas.openxmlformats.org/drawingml/2006/main" xmlns:r="http://schemas.openxmlformats.org/officeDocument/2006/relationships" xmlns:p="http://schemas.openxmlformats.org/presentationml/2006/main">
+  <p:cSld>
+    <p:spTree>
+      <p:nvGrpSpPr>
+        <p:cNvPr id="1" name=""/>
+        <p:cNvGrpSpPr/>
+        <p:nvPr/>
+      </p:nvGrpSpPr>
+      <p:grpSpPr>
+        <a:xfrm>
+          <a:off x="0" y="0"/>
+          <a:ext cx="0" cy="0"/>
+          <a:chOff x="0" y="0"/>
+          <a:chExt cx="0" cy="0"/>
+        </a:xfrm>
+      </p:grpSpPr>
+      <p:sp>
+        <p:nvSpPr>
+          <p:cNvPr id="2" name="標題 1">
+            <a:extLst>
+              <a:ext uri="{FF2B5EF4-FFF2-40B4-BE49-F238E27FC236}">
                 <a16:creationId xmlns:a16="http://schemas.microsoft.com/office/drawing/2014/main" id="{70FB0DA9-E48F-8219-EB95-9ABBE688E849}"/>
               </a:ext>
             </a:extLst>
@@ -9354,7 +10547,7 @@
           <a:p>
             <a:fld id="{666274A1-CF9C-426A-8DD4-B13ED0C24231}" type="slidenum">
               <a:rPr lang="en-US" smtClean="0"/>
-              <a:t>16</a:t>
+              <a:t>19</a:t>
             </a:fld>
             <a:endParaRPr lang="en-US"/>
           </a:p>
@@ -9428,7 +10621,7 @@
 </p:sld>
 </file>
 
-<file path=ppt/slides/slide18.xml><?xml version="1.0" encoding="utf-8"?>
+<file path=ppt/slides/slide21.xml><?xml version="1.0" encoding="utf-8"?>
 <p:sld xmlns:a="http://schemas.openxmlformats.org/drawingml/2006/main" xmlns:r="http://schemas.openxmlformats.org/officeDocument/2006/relationships" xmlns:p="http://schemas.openxmlformats.org/presentationml/2006/main">
   <p:cSld>
     <p:spTree>
@@ -9563,7 +10756,7 @@
           <a:p>
             <a:fld id="{666274A1-CF9C-426A-8DD4-B13ED0C24231}" type="slidenum">
               <a:rPr lang="en-US" smtClean="0"/>
-              <a:t>17</a:t>
+              <a:t>20</a:t>
             </a:fld>
             <a:endParaRPr lang="en-US"/>
           </a:p>
@@ -9612,7 +10805,7 @@
 </p:sld>
 </file>
 
-<file path=ppt/slides/slide19.xml><?xml version="1.0" encoding="utf-8"?>
+<file path=ppt/slides/slide22.xml><?xml version="1.0" encoding="utf-8"?>
 <p:sld xmlns:a="http://schemas.openxmlformats.org/drawingml/2006/main" xmlns:r="http://schemas.openxmlformats.org/officeDocument/2006/relationships" xmlns:p="http://schemas.openxmlformats.org/presentationml/2006/main">
   <p:cSld>
     <p:spTree>
@@ -9929,7 +11122,7 @@
           <a:p>
             <a:fld id="{666274A1-CF9C-426A-8DD4-B13ED0C24231}" type="slidenum">
               <a:rPr lang="en-US" smtClean="0"/>
-              <a:t>18</a:t>
+              <a:t>21</a:t>
             </a:fld>
             <a:endParaRPr lang="en-US" dirty="0"/>
           </a:p>
@@ -10124,7 +11317,7 @@
 </p:sld>
 </file>
 
-<file path=ppt/slides/slide2.xml><?xml version="1.0" encoding="utf-8"?>
+<file path=ppt/slides/slide23.xml><?xml version="1.0" encoding="utf-8"?>
 <p:sld xmlns:a="http://schemas.openxmlformats.org/drawingml/2006/main" xmlns:r="http://schemas.openxmlformats.org/officeDocument/2006/relationships" xmlns:p="http://schemas.openxmlformats.org/presentationml/2006/main">
   <p:cSld>
     <p:spTree>
@@ -10146,7 +11339,7 @@
           <p:cNvPr id="2" name="標題 1">
             <a:extLst>
               <a:ext uri="{FF2B5EF4-FFF2-40B4-BE49-F238E27FC236}">
-                <a16:creationId xmlns:a16="http://schemas.microsoft.com/office/drawing/2014/main" id="{F95E0C03-DA09-BCA5-440A-A05C34D99715}"/>
+                <a16:creationId xmlns:a16="http://schemas.microsoft.com/office/drawing/2014/main" id="{76B33A3F-DD1F-491A-A3CB-A472026661C8}"/>
               </a:ext>
             </a:extLst>
           </p:cNvPr>
@@ -10163,107 +11356,329 @@
           <a:lstStyle/>
           <a:p>
             <a:r>
-              <a:rPr lang="en-US" altLang="zh-TW" sz="4000" dirty="0">
-                <a:latin typeface="Times" panose="02020603050405020304" pitchFamily="18" charset="0"/>
-                <a:cs typeface="Times" panose="02020603050405020304" pitchFamily="18" charset="0"/>
+              <a:rPr kumimoji="0" lang="en-US" altLang="zh-TW" sz="4000" b="0" i="0" u="none" strike="noStrike" kern="1200" cap="none" spc="0" normalizeH="0" baseline="0" noProof="0" dirty="0">
+                <a:ln>
+                  <a:noFill/>
+                </a:ln>
+                <a:solidFill>
+                  <a:prstClr val="black"/>
+                </a:solidFill>
+                <a:effectLst/>
+                <a:uLnTx/>
+                <a:uFillTx/>
+                <a:latin typeface="Times New Roman"/>
+                <a:ea typeface="標楷體"/>
+                <a:cs typeface="+mj-cs"/>
               </a:rPr>
-              <a:t>Outline</a:t>
-            </a:r>
-            <a:endParaRPr lang="zh-TW" altLang="en-US" dirty="0">
-              <a:latin typeface="Times" panose="02020603050405020304" pitchFamily="18" charset="0"/>
-              <a:cs typeface="Times" panose="02020603050405020304" pitchFamily="18" charset="0"/>
-            </a:endParaRPr>
-          </a:p>
-        </p:txBody>
-      </p:sp>
-      <p:sp>
-        <p:nvSpPr>
-          <p:cNvPr id="3" name="內容版面配置區 2">
-            <a:extLst>
-              <a:ext uri="{FF2B5EF4-FFF2-40B4-BE49-F238E27FC236}">
-                <a16:creationId xmlns:a16="http://schemas.microsoft.com/office/drawing/2014/main" id="{F671C038-AE51-E136-6B1E-6C38BF235BBE}"/>
-              </a:ext>
-            </a:extLst>
-          </p:cNvPr>
-          <p:cNvSpPr>
-            <a:spLocks noGrp="1"/>
-          </p:cNvSpPr>
-          <p:nvPr>
-            <p:ph idx="1"/>
-          </p:nvPr>
-        </p:nvSpPr>
-        <p:spPr bwMode="auto">
-          <a:xfrm>
-            <a:off x="838200" y="1620000"/>
-            <a:ext cx="10515600" cy="4351338"/>
-          </a:xfrm>
-        </p:spPr>
-        <p:txBody>
-          <a:bodyPr>
-            <a:normAutofit/>
-          </a:bodyPr>
-          <a:lstStyle/>
-          <a:p>
-            <a:pPr>
-              <a:lnSpc>
-                <a:spcPct val="150000"/>
-              </a:lnSpc>
-            </a:pPr>
-            <a:r>
-              <a:rPr lang="en-US" altLang="zh-TW" sz="2400" dirty="0"/>
-              <a:t>Introduction</a:t>
-            </a:r>
-          </a:p>
-          <a:p>
-            <a:pPr>
-              <a:lnSpc>
-                <a:spcPct val="150000"/>
-              </a:lnSpc>
-            </a:pPr>
-            <a:r>
-              <a:rPr lang="en-US" altLang="zh-TW" sz="2400" dirty="0"/>
-              <a:t>Preliminaries</a:t>
-            </a:r>
-          </a:p>
-          <a:p>
-            <a:pPr>
-              <a:lnSpc>
-                <a:spcPct val="150000"/>
-              </a:lnSpc>
-            </a:pPr>
-            <a:r>
-              <a:rPr lang="en-US" altLang="zh-TW" sz="2400" dirty="0"/>
               <a:t>Methodology</a:t>
             </a:r>
-          </a:p>
-          <a:p>
-            <a:pPr>
-              <a:lnSpc>
-                <a:spcPct val="150000"/>
-              </a:lnSpc>
-            </a:pPr>
-            <a:r>
-              <a:rPr lang="en-US" altLang="zh-TW" sz="2400" dirty="0"/>
-              <a:t>Experimental</a:t>
-            </a:r>
-            <a:r>
-              <a:rPr lang="en-US" altLang="zh-TW" dirty="0"/>
+            <a:r>
+              <a:rPr kumimoji="0" lang="en-US" altLang="zh-TW" sz="4400" b="0" i="0" u="none" strike="noStrike" kern="1200" cap="none" spc="0" normalizeH="0" baseline="0" noProof="0" dirty="0">
+                <a:ln>
+                  <a:noFill/>
+                </a:ln>
+                <a:solidFill>
+                  <a:prstClr val="black"/>
+                </a:solidFill>
+                <a:effectLst/>
+                <a:uLnTx/>
+                <a:uFillTx/>
+                <a:latin typeface="Times New Roman"/>
+                <a:ea typeface="標楷體"/>
+                <a:cs typeface="+mj-cs"/>
+              </a:rPr>
               <a:t> </a:t>
             </a:r>
             <a:r>
-              <a:rPr lang="en-US" altLang="zh-TW" sz="2400" dirty="0"/>
-              <a:t>Results</a:t>
+              <a:rPr kumimoji="0" lang="en-US" altLang="zh-TW" sz="2800" b="0" i="0" u="none" strike="noStrike" kern="1200" cap="none" spc="0" normalizeH="0" baseline="0" noProof="0" dirty="0">
+                <a:ln>
+                  <a:noFill/>
+                </a:ln>
+                <a:solidFill>
+                  <a:prstClr val="black"/>
+                </a:solidFill>
+                <a:effectLst/>
+                <a:uLnTx/>
+                <a:uFillTx/>
+                <a:latin typeface="Times New Roman"/>
+                <a:ea typeface="標楷體"/>
+                <a:cs typeface="+mj-cs"/>
+              </a:rPr>
+              <a:t>– Model Prediction and ECO Selection</a:t>
             </a:r>
             <a:endParaRPr lang="zh-TW" altLang="en-US" dirty="0"/>
           </a:p>
         </p:txBody>
       </p:sp>
+      <mc:AlternateContent xmlns:mc="http://schemas.openxmlformats.org/markup-compatibility/2006">
+        <mc:Choice xmlns:a14="http://schemas.microsoft.com/office/drawing/2010/main" Requires="a14">
+          <p:sp>
+            <p:nvSpPr>
+              <p:cNvPr id="3" name="內容版面配置區 2">
+                <a:extLst>
+                  <a:ext uri="{FF2B5EF4-FFF2-40B4-BE49-F238E27FC236}">
+                    <a16:creationId xmlns:a16="http://schemas.microsoft.com/office/drawing/2014/main" id="{B88EB786-1B26-7EF7-3DDE-66FC4B1612CC}"/>
+                  </a:ext>
+                </a:extLst>
+              </p:cNvPr>
+              <p:cNvSpPr>
+                <a:spLocks noGrp="1"/>
+              </p:cNvSpPr>
+              <p:nvPr>
+                <p:ph idx="1"/>
+              </p:nvPr>
+            </p:nvSpPr>
+            <p:spPr/>
+            <p:txBody>
+              <a:bodyPr>
+                <a:normAutofit/>
+              </a:bodyPr>
+              <a:lstStyle/>
+              <a:p>
+                <a:pPr>
+                  <a:lnSpc>
+                    <a:spcPct val="150000"/>
+                  </a:lnSpc>
+                </a:pPr>
+                <a:r>
+                  <a:rPr lang="en-US" altLang="zh-TW" sz="2200" dirty="0"/>
+                  <a:t>Different settings of </a:t>
+                </a:r>
+                <a14:m>
+                  <m:oMath xmlns:m="http://schemas.openxmlformats.org/officeDocument/2006/math">
+                    <m:sSub>
+                      <m:sSubPr>
+                        <m:ctrlPr>
+                          <a:rPr lang="en-US" altLang="zh-TW" sz="2200" i="1" dirty="0" smtClean="0">
+                            <a:latin typeface="Cambria Math" panose="02040503050406030204" pitchFamily="18" charset="0"/>
+                          </a:rPr>
+                        </m:ctrlPr>
+                      </m:sSubPr>
+                      <m:e>
+                        <m:r>
+                          <a:rPr lang="zh-TW" altLang="en-US" sz="2200" i="1" dirty="0">
+                            <a:latin typeface="Cambria Math" panose="02040503050406030204" pitchFamily="18" charset="0"/>
+                          </a:rPr>
+                          <m:t>𝑆𝑀𝐷</m:t>
+                        </m:r>
+                      </m:e>
+                      <m:sub>
+                        <m:r>
+                          <a:rPr lang="en-US" altLang="zh-TW" sz="2200" b="0" i="1" dirty="0" smtClean="0">
+                            <a:latin typeface="Cambria Math" panose="02040503050406030204" pitchFamily="18" charset="0"/>
+                          </a:rPr>
+                          <m:t>𝑖</m:t>
+                        </m:r>
+                      </m:sub>
+                    </m:sSub>
+                  </m:oMath>
+                </a14:m>
+                <a:r>
+                  <a:rPr lang="zh-TW" altLang="en-US" sz="2200" dirty="0"/>
+                  <a:t> </a:t>
+                </a:r>
+                <a:r>
+                  <a:rPr lang="en-US" altLang="zh-TW" sz="2200" dirty="0"/>
+                  <a:t>are applied during the model inference.</a:t>
+                </a:r>
+              </a:p>
+              <a:p>
+                <a:pPr lvl="1">
+                  <a:lnSpc>
+                    <a:spcPct val="150000"/>
+                  </a:lnSpc>
+                </a:pPr>
+                <a:r>
+                  <a:rPr lang="en-US" altLang="zh-TW" sz="1800" dirty="0"/>
+                  <a:t>Reflecting sub-meshes of various densities.</a:t>
+                </a:r>
+              </a:p>
+              <a:p>
+                <a:pPr lvl="1">
+                  <a:lnSpc>
+                    <a:spcPct val="150000"/>
+                  </a:lnSpc>
+                </a:pPr>
+                <a:endParaRPr lang="en-US" altLang="zh-TW" sz="400" dirty="0"/>
+              </a:p>
+              <a:p>
+                <a:pPr>
+                  <a:lnSpc>
+                    <a:spcPct val="150000"/>
+                  </a:lnSpc>
+                </a:pPr>
+                <a:r>
+                  <a:rPr lang="en-US" altLang="zh-TW" sz="2200" dirty="0"/>
+                  <a:t>Choose smallest </a:t>
+                </a:r>
+                <a14:m>
+                  <m:oMath xmlns:m="http://schemas.openxmlformats.org/officeDocument/2006/math">
+                    <m:sSub>
+                      <m:sSubPr>
+                        <m:ctrlPr>
+                          <a:rPr lang="en-US" altLang="zh-TW" sz="2200" i="1" dirty="0" smtClean="0">
+                            <a:latin typeface="Cambria Math" panose="02040503050406030204" pitchFamily="18" charset="0"/>
+                          </a:rPr>
+                        </m:ctrlPr>
+                      </m:sSubPr>
+                      <m:e>
+                        <m:r>
+                          <a:rPr lang="zh-TW" altLang="en-US" sz="2200" i="1" dirty="0">
+                            <a:latin typeface="Cambria Math" panose="02040503050406030204" pitchFamily="18" charset="0"/>
+                          </a:rPr>
+                          <m:t>𝑆𝑀𝐷</m:t>
+                        </m:r>
+                      </m:e>
+                      <m:sub>
+                        <m:r>
+                          <a:rPr lang="en-US" altLang="zh-TW" sz="2200" b="0" i="1" dirty="0" smtClean="0">
+                            <a:latin typeface="Cambria Math" panose="02040503050406030204" pitchFamily="18" charset="0"/>
+                          </a:rPr>
+                          <m:t>𝑖</m:t>
+                        </m:r>
+                      </m:sub>
+                    </m:sSub>
+                  </m:oMath>
+                </a14:m>
+                <a:r>
+                  <a:rPr lang="zh-TW" altLang="en-US" sz="2200" dirty="0"/>
+                  <a:t> </a:t>
+                </a:r>
+                <a:r>
+                  <a:rPr lang="en-US" altLang="zh-TW" sz="2200" dirty="0"/>
+                  <a:t>setting that meets the IR drop constraint and has no DRC hotspot.</a:t>
+                </a:r>
+              </a:p>
+              <a:p>
+                <a:pPr lvl="1">
+                  <a:lnSpc>
+                    <a:spcPct val="150000"/>
+                  </a:lnSpc>
+                </a:pPr>
+                <a:r>
+                  <a:rPr lang="en-US" altLang="zh-TW" sz="1800" dirty="0"/>
+                  <a:t>Be the sub-mesh configuration for the grid where the cross-domain cell is located.</a:t>
+                </a:r>
+              </a:p>
+              <a:p>
+                <a:pPr lvl="1">
+                  <a:lnSpc>
+                    <a:spcPct val="150000"/>
+                  </a:lnSpc>
+                </a:pPr>
+                <a:endParaRPr lang="en-US" altLang="zh-TW" sz="400" dirty="0"/>
+              </a:p>
+              <a:p>
+                <a:pPr>
+                  <a:lnSpc>
+                    <a:spcPct val="150000"/>
+                  </a:lnSpc>
+                </a:pPr>
+                <a:r>
+                  <a:rPr lang="en-US" altLang="zh-TW" sz="2200" dirty="0"/>
+                  <a:t>If no </a:t>
+                </a:r>
+                <a14:m>
+                  <m:oMath xmlns:m="http://schemas.openxmlformats.org/officeDocument/2006/math">
+                    <m:sSub>
+                      <m:sSubPr>
+                        <m:ctrlPr>
+                          <a:rPr lang="en-US" altLang="zh-TW" sz="2200" i="1" dirty="0" smtClean="0">
+                            <a:latin typeface="Cambria Math" panose="02040503050406030204" pitchFamily="18" charset="0"/>
+                          </a:rPr>
+                        </m:ctrlPr>
+                      </m:sSubPr>
+                      <m:e>
+                        <m:r>
+                          <a:rPr lang="zh-TW" altLang="en-US" sz="2200" i="1" dirty="0">
+                            <a:latin typeface="Cambria Math" panose="02040503050406030204" pitchFamily="18" charset="0"/>
+                          </a:rPr>
+                          <m:t>𝑆𝑀𝐷</m:t>
+                        </m:r>
+                      </m:e>
+                      <m:sub>
+                        <m:r>
+                          <a:rPr lang="en-US" altLang="zh-TW" sz="2200" b="0" i="1" dirty="0" smtClean="0">
+                            <a:latin typeface="Cambria Math" panose="02040503050406030204" pitchFamily="18" charset="0"/>
+                          </a:rPr>
+                          <m:t>𝑖</m:t>
+                        </m:r>
+                      </m:sub>
+                    </m:sSub>
+                    <m:r>
+                      <a:rPr lang="en-US" altLang="zh-TW" sz="2200" b="0" i="1" dirty="0" smtClean="0">
+                        <a:latin typeface="Cambria Math" panose="02040503050406030204" pitchFamily="18" charset="0"/>
+                      </a:rPr>
+                      <m:t> </m:t>
+                    </m:r>
+                  </m:oMath>
+                </a14:m>
+                <a:r>
+                  <a:rPr lang="en-US" altLang="zh-TW" sz="2200" dirty="0"/>
+                  <a:t>setting meets both requirements.</a:t>
+                </a:r>
+              </a:p>
+              <a:p>
+                <a:pPr lvl="1">
+                  <a:lnSpc>
+                    <a:spcPct val="150000"/>
+                  </a:lnSpc>
+                </a:pPr>
+                <a:r>
+                  <a:rPr lang="en-US" altLang="zh-TW" sz="1800" dirty="0"/>
+                  <a:t>The grid will be skipped and handled by ECO.</a:t>
+                </a:r>
+                <a:endParaRPr lang="zh-TW" altLang="en-US" sz="1800" dirty="0"/>
+              </a:p>
+            </p:txBody>
+          </p:sp>
+        </mc:Choice>
+        <mc:Fallback>
+          <p:sp>
+            <p:nvSpPr>
+              <p:cNvPr id="3" name="內容版面配置區 2">
+                <a:extLst>
+                  <a:ext uri="{FF2B5EF4-FFF2-40B4-BE49-F238E27FC236}">
+                    <a16:creationId xmlns:a16="http://schemas.microsoft.com/office/drawing/2014/main" id="{B88EB786-1B26-7EF7-3DDE-66FC4B1612CC}"/>
+                  </a:ext>
+                </a:extLst>
+              </p:cNvPr>
+              <p:cNvSpPr>
+                <a:spLocks noGrp="1" noRot="1" noChangeAspect="1" noMove="1" noResize="1" noEditPoints="1" noAdjustHandles="1" noChangeArrowheads="1" noChangeShapeType="1" noTextEdit="1"/>
+              </p:cNvSpPr>
+              <p:nvPr>
+                <p:ph idx="1"/>
+              </p:nvPr>
+            </p:nvSpPr>
+            <p:spPr>
+              <a:blipFill>
+                <a:blip r:embed="rId2"/>
+                <a:stretch>
+                  <a:fillRect l="-696"/>
+                </a:stretch>
+              </a:blipFill>
+            </p:spPr>
+            <p:txBody>
+              <a:bodyPr/>
+              <a:lstStyle/>
+              <a:p>
+                <a:r>
+                  <a:rPr lang="zh-TW" altLang="en-US">
+                    <a:noFill/>
+                  </a:rPr>
+                  <a:t> </a:t>
+                </a:r>
+              </a:p>
+            </p:txBody>
+          </p:sp>
+        </mc:Fallback>
+      </mc:AlternateContent>
       <p:sp>
         <p:nvSpPr>
           <p:cNvPr id="4" name="投影片編號版面配置區 3">
             <a:extLst>
               <a:ext uri="{FF2B5EF4-FFF2-40B4-BE49-F238E27FC236}">
-                <a16:creationId xmlns:a16="http://schemas.microsoft.com/office/drawing/2014/main" id="{5891B803-9796-C957-1032-D2F5DFAFFD47}"/>
+                <a16:creationId xmlns:a16="http://schemas.microsoft.com/office/drawing/2014/main" id="{6FD16732-0E72-A2A2-89D2-42D674E18730}"/>
               </a:ext>
             </a:extLst>
           </p:cNvPr>
@@ -10281,7 +11696,7 @@
           <a:p>
             <a:fld id="{666274A1-CF9C-426A-8DD4-B13ED0C24231}" type="slidenum">
               <a:rPr lang="en-US" smtClean="0"/>
-              <a:t>1</a:t>
+              <a:t>22</a:t>
             </a:fld>
             <a:endParaRPr lang="en-US"/>
           </a:p>
@@ -10290,7 +11705,7 @@
     </p:spTree>
     <p:extLst>
       <p:ext uri="{BB962C8B-B14F-4D97-AF65-F5344CB8AC3E}">
-        <p14:creationId xmlns:p14="http://schemas.microsoft.com/office/powerpoint/2010/main" val="701454037"/>
+        <p14:creationId xmlns:p14="http://schemas.microsoft.com/office/powerpoint/2010/main" val="826746291"/>
       </p:ext>
     </p:extLst>
   </p:cSld>
@@ -10300,7 +11715,7 @@
 </p:sld>
 </file>
 
-<file path=ppt/slides/slide20.xml><?xml version="1.0" encoding="utf-8"?>
+<file path=ppt/slides/slide24.xml><?xml version="1.0" encoding="utf-8"?>
 <p:sld xmlns:a="http://schemas.openxmlformats.org/drawingml/2006/main" xmlns:r="http://schemas.openxmlformats.org/officeDocument/2006/relationships" xmlns:p="http://schemas.openxmlformats.org/presentationml/2006/main">
   <p:cSld>
     <p:spTree>
@@ -10322,7 +11737,7 @@
           <p:cNvPr id="2" name="標題 1">
             <a:extLst>
               <a:ext uri="{FF2B5EF4-FFF2-40B4-BE49-F238E27FC236}">
-                <a16:creationId xmlns:a16="http://schemas.microsoft.com/office/drawing/2014/main" id="{76B33A3F-DD1F-491A-A3CB-A472026661C8}"/>
+                <a16:creationId xmlns:a16="http://schemas.microsoft.com/office/drawing/2014/main" id="{F95E0C03-DA09-BCA5-440A-A05C34D99715}"/>
               </a:ext>
             </a:extLst>
           </p:cNvPr>
@@ -10339,55 +11754,114 @@
           <a:lstStyle/>
           <a:p>
             <a:r>
-              <a:rPr kumimoji="0" lang="en-US" altLang="zh-TW" sz="4000" b="0" i="0" u="none" strike="noStrike" kern="1200" cap="none" spc="0" normalizeH="0" baseline="0" noProof="0" dirty="0">
-                <a:ln>
-                  <a:noFill/>
-                </a:ln>
+              <a:rPr lang="en-US" altLang="zh-TW" sz="4000" dirty="0">
+                <a:latin typeface="Times" panose="02020603050405020304" pitchFamily="18" charset="0"/>
+                <a:cs typeface="Times" panose="02020603050405020304" pitchFamily="18" charset="0"/>
+              </a:rPr>
+              <a:t>Outline</a:t>
+            </a:r>
+            <a:endParaRPr lang="zh-TW" altLang="en-US" dirty="0">
+              <a:latin typeface="Times" panose="02020603050405020304" pitchFamily="18" charset="0"/>
+              <a:cs typeface="Times" panose="02020603050405020304" pitchFamily="18" charset="0"/>
+            </a:endParaRPr>
+          </a:p>
+        </p:txBody>
+      </p:sp>
+      <p:sp>
+        <p:nvSpPr>
+          <p:cNvPr id="3" name="內容版面配置區 2">
+            <a:extLst>
+              <a:ext uri="{FF2B5EF4-FFF2-40B4-BE49-F238E27FC236}">
+                <a16:creationId xmlns:a16="http://schemas.microsoft.com/office/drawing/2014/main" id="{F671C038-AE51-E136-6B1E-6C38BF235BBE}"/>
+              </a:ext>
+            </a:extLst>
+          </p:cNvPr>
+          <p:cNvSpPr>
+            <a:spLocks noGrp="1"/>
+          </p:cNvSpPr>
+          <p:nvPr>
+            <p:ph idx="1"/>
+          </p:nvPr>
+        </p:nvSpPr>
+        <p:spPr bwMode="auto">
+          <a:xfrm>
+            <a:off x="838200" y="1620000"/>
+            <a:ext cx="10515600" cy="4351338"/>
+          </a:xfrm>
+        </p:spPr>
+        <p:txBody>
+          <a:bodyPr>
+            <a:normAutofit/>
+          </a:bodyPr>
+          <a:lstStyle/>
+          <a:p>
+            <a:pPr>
+              <a:lnSpc>
+                <a:spcPct val="150000"/>
+              </a:lnSpc>
+            </a:pPr>
+            <a:r>
+              <a:rPr lang="en-US" altLang="zh-TW" sz="2400" dirty="0">
                 <a:solidFill>
-                  <a:prstClr val="black"/>
+                  <a:schemeClr val="bg1">
+                    <a:lumMod val="65000"/>
+                  </a:schemeClr>
                 </a:solidFill>
-                <a:effectLst/>
-                <a:uLnTx/>
-                <a:uFillTx/>
-                <a:latin typeface="Times New Roman"/>
-                <a:ea typeface="標楷體"/>
-                <a:cs typeface="+mj-cs"/>
+              </a:rPr>
+              <a:t>Introduction</a:t>
+            </a:r>
+          </a:p>
+          <a:p>
+            <a:pPr>
+              <a:lnSpc>
+                <a:spcPct val="150000"/>
+              </a:lnSpc>
+            </a:pPr>
+            <a:r>
+              <a:rPr lang="en-US" altLang="zh-TW" sz="2400" dirty="0">
+                <a:solidFill>
+                  <a:schemeClr val="bg1">
+                    <a:lumMod val="65000"/>
+                  </a:schemeClr>
+                </a:solidFill>
+              </a:rPr>
+              <a:t>Preliminaries</a:t>
+            </a:r>
+          </a:p>
+          <a:p>
+            <a:pPr>
+              <a:lnSpc>
+                <a:spcPct val="150000"/>
+              </a:lnSpc>
+            </a:pPr>
+            <a:r>
+              <a:rPr lang="en-US" altLang="zh-TW" sz="2400" dirty="0">
+                <a:solidFill>
+                  <a:schemeClr val="bg1">
+                    <a:lumMod val="65000"/>
+                  </a:schemeClr>
+                </a:solidFill>
               </a:rPr>
               <a:t>Methodology</a:t>
             </a:r>
-            <a:r>
-              <a:rPr kumimoji="0" lang="en-US" altLang="zh-TW" sz="4400" b="0" i="0" u="none" strike="noStrike" kern="1200" cap="none" spc="0" normalizeH="0" baseline="0" noProof="0" dirty="0">
-                <a:ln>
-                  <a:noFill/>
-                </a:ln>
-                <a:solidFill>
-                  <a:prstClr val="black"/>
-                </a:solidFill>
-                <a:effectLst/>
-                <a:uLnTx/>
-                <a:uFillTx/>
-                <a:latin typeface="Times New Roman"/>
-                <a:ea typeface="標楷體"/>
-                <a:cs typeface="+mj-cs"/>
-              </a:rPr>
+          </a:p>
+          <a:p>
+            <a:pPr>
+              <a:lnSpc>
+                <a:spcPct val="150000"/>
+              </a:lnSpc>
+            </a:pPr>
+            <a:r>
+              <a:rPr lang="en-US" altLang="zh-TW" sz="2400" dirty="0"/>
+              <a:t>Experimental</a:t>
+            </a:r>
+            <a:r>
+              <a:rPr lang="en-US" altLang="zh-TW" dirty="0"/>
               <a:t> </a:t>
             </a:r>
             <a:r>
-              <a:rPr kumimoji="0" lang="en-US" altLang="zh-TW" sz="2800" b="0" i="0" u="none" strike="noStrike" kern="1200" cap="none" spc="0" normalizeH="0" baseline="0" noProof="0" dirty="0">
-                <a:ln>
-                  <a:noFill/>
-                </a:ln>
-                <a:solidFill>
-                  <a:prstClr val="black"/>
-                </a:solidFill>
-                <a:effectLst/>
-                <a:uLnTx/>
-                <a:uFillTx/>
-                <a:latin typeface="Times New Roman"/>
-                <a:ea typeface="標楷體"/>
-                <a:cs typeface="+mj-cs"/>
-              </a:rPr>
-              <a:t>– Model Prediction and ECO Selection</a:t>
+              <a:rPr lang="en-US" altLang="zh-TW" sz="2400" dirty="0"/>
+              <a:t>Results</a:t>
             </a:r>
             <a:endParaRPr lang="zh-TW" altLang="en-US" dirty="0"/>
           </a:p>
@@ -10395,35 +11869,10 @@
       </p:sp>
       <p:sp>
         <p:nvSpPr>
-          <p:cNvPr id="3" name="內容版面配置區 2">
-            <a:extLst>
-              <a:ext uri="{FF2B5EF4-FFF2-40B4-BE49-F238E27FC236}">
-                <a16:creationId xmlns:a16="http://schemas.microsoft.com/office/drawing/2014/main" id="{B88EB786-1B26-7EF7-3DDE-66FC4B1612CC}"/>
-              </a:ext>
-            </a:extLst>
-          </p:cNvPr>
-          <p:cNvSpPr>
-            <a:spLocks noGrp="1"/>
-          </p:cNvSpPr>
-          <p:nvPr>
-            <p:ph idx="1"/>
-          </p:nvPr>
-        </p:nvSpPr>
-        <p:spPr/>
-        <p:txBody>
-          <a:bodyPr/>
-          <a:lstStyle/>
-          <a:p>
-            <a:endParaRPr lang="zh-TW" altLang="en-US"/>
-          </a:p>
-        </p:txBody>
-      </p:sp>
-      <p:sp>
-        <p:nvSpPr>
           <p:cNvPr id="4" name="投影片編號版面配置區 3">
             <a:extLst>
               <a:ext uri="{FF2B5EF4-FFF2-40B4-BE49-F238E27FC236}">
-                <a16:creationId xmlns:a16="http://schemas.microsoft.com/office/drawing/2014/main" id="{6FD16732-0E72-A2A2-89D2-42D674E18730}"/>
+                <a16:creationId xmlns:a16="http://schemas.microsoft.com/office/drawing/2014/main" id="{5891B803-9796-C957-1032-D2F5DFAFFD47}"/>
               </a:ext>
             </a:extLst>
           </p:cNvPr>
@@ -10441,7 +11890,7 @@
           <a:p>
             <a:fld id="{666274A1-CF9C-426A-8DD4-B13ED0C24231}" type="slidenum">
               <a:rPr lang="en-US" smtClean="0"/>
-              <a:t>19</a:t>
+              <a:t>23</a:t>
             </a:fld>
             <a:endParaRPr lang="en-US"/>
           </a:p>
@@ -10450,7 +11899,7 @@
     </p:spTree>
     <p:extLst>
       <p:ext uri="{BB962C8B-B14F-4D97-AF65-F5344CB8AC3E}">
-        <p14:creationId xmlns:p14="http://schemas.microsoft.com/office/powerpoint/2010/main" val="826746291"/>
+        <p14:creationId xmlns:p14="http://schemas.microsoft.com/office/powerpoint/2010/main" val="3870443105"/>
       </p:ext>
     </p:extLst>
   </p:cSld>
@@ -10460,7 +11909,7 @@
 </p:sld>
 </file>
 
-<file path=ppt/slides/slide21.xml><?xml version="1.0" encoding="utf-8"?>
+<file path=ppt/slides/slide25.xml><?xml version="1.0" encoding="utf-8"?>
 <p:sld xmlns:a="http://schemas.openxmlformats.org/drawingml/2006/main" xmlns:r="http://schemas.openxmlformats.org/officeDocument/2006/relationships" xmlns:p="http://schemas.openxmlformats.org/presentationml/2006/main">
   <p:cSld>
     <p:spTree>
@@ -10654,7 +12103,7 @@
           <a:p>
             <a:fld id="{666274A1-CF9C-426A-8DD4-B13ED0C24231}" type="slidenum">
               <a:rPr lang="en-US" smtClean="0"/>
-              <a:t>20</a:t>
+              <a:t>24</a:t>
             </a:fld>
             <a:endParaRPr lang="en-US"/>
           </a:p>
@@ -10703,7 +12152,7 @@
 </p:sld>
 </file>
 
-<file path=ppt/slides/slide22.xml><?xml version="1.0" encoding="utf-8"?>
+<file path=ppt/slides/slide26.xml><?xml version="1.0" encoding="utf-8"?>
 <p:sld xmlns:a="http://schemas.openxmlformats.org/drawingml/2006/main" xmlns:r="http://schemas.openxmlformats.org/officeDocument/2006/relationships" xmlns:p="http://schemas.openxmlformats.org/presentationml/2006/main">
   <p:cSld>
     <p:spTree>
@@ -10880,7 +12329,7 @@
           <a:p>
             <a:fld id="{666274A1-CF9C-426A-8DD4-B13ED0C24231}" type="slidenum">
               <a:rPr lang="en-US" smtClean="0"/>
-              <a:t>21</a:t>
+              <a:t>25</a:t>
             </a:fld>
             <a:endParaRPr lang="en-US"/>
           </a:p>
@@ -10899,7 +12348,7 @@
 </p:sld>
 </file>
 
-<file path=ppt/slides/slide23.xml><?xml version="1.0" encoding="utf-8"?>
+<file path=ppt/slides/slide27.xml><?xml version="1.0" encoding="utf-8"?>
 <p:sld xmlns:a="http://schemas.openxmlformats.org/drawingml/2006/main" xmlns:r="http://schemas.openxmlformats.org/officeDocument/2006/relationships" xmlns:p="http://schemas.openxmlformats.org/presentationml/2006/main">
   <p:cSld>
     <p:spTree>
@@ -11117,7 +12566,7 @@
           <a:p>
             <a:fld id="{666274A1-CF9C-426A-8DD4-B13ED0C24231}" type="slidenum">
               <a:rPr lang="en-US" smtClean="0"/>
-              <a:t>22</a:t>
+              <a:t>26</a:t>
             </a:fld>
             <a:endParaRPr lang="en-US"/>
           </a:p>
@@ -11136,7 +12585,7 @@
 </p:sld>
 </file>
 
-<file path=ppt/slides/slide24.xml><?xml version="1.0" encoding="utf-8"?>
+<file path=ppt/slides/slide28.xml><?xml version="1.0" encoding="utf-8"?>
 <p:sld xmlns:a="http://schemas.openxmlformats.org/drawingml/2006/main" xmlns:r="http://schemas.openxmlformats.org/officeDocument/2006/relationships" xmlns:p="http://schemas.openxmlformats.org/presentationml/2006/main">
   <p:cSld>
     <p:spTree>
@@ -11201,7 +12650,7 @@
           <a:p>
             <a:fld id="{666274A1-CF9C-426A-8DD4-B13ED0C24231}" type="slidenum">
               <a:rPr lang="en-US" smtClean="0"/>
-              <a:t>23</a:t>
+              <a:t>27</a:t>
             </a:fld>
             <a:endParaRPr lang="en-US"/>
           </a:p>
@@ -11250,7 +12699,7 @@
 </p:sld>
 </file>
 
-<file path=ppt/slides/slide25.xml><?xml version="1.0" encoding="utf-8"?>
+<file path=ppt/slides/slide29.xml><?xml version="1.0" encoding="utf-8"?>
 <p:sld xmlns:a="http://schemas.openxmlformats.org/drawingml/2006/main" xmlns:r="http://schemas.openxmlformats.org/officeDocument/2006/relationships" xmlns:p="http://schemas.openxmlformats.org/presentationml/2006/main">
   <p:cSld>
     <p:spTree>
@@ -11352,7 +12801,7 @@
           <a:p>
             <a:fld id="{666274A1-CF9C-426A-8DD4-B13ED0C24231}" type="slidenum">
               <a:rPr lang="en-US" smtClean="0"/>
-              <a:t>24</a:t>
+              <a:t>28</a:t>
             </a:fld>
             <a:endParaRPr lang="en-US"/>
           </a:p>
@@ -11401,7 +12850,7 @@
 </p:sld>
 </file>
 
-<file path=ppt/slides/slide26.xml><?xml version="1.0" encoding="utf-8"?>
+<file path=ppt/slides/slide3.xml><?xml version="1.0" encoding="utf-8"?>
 <p:sld xmlns:a="http://schemas.openxmlformats.org/drawingml/2006/main" xmlns:r="http://schemas.openxmlformats.org/officeDocument/2006/relationships" xmlns:p="http://schemas.openxmlformats.org/presentationml/2006/main">
   <p:cSld>
     <p:spTree>
@@ -11423,7 +12872,7 @@
           <p:cNvPr id="2" name="標題 1">
             <a:extLst>
               <a:ext uri="{FF2B5EF4-FFF2-40B4-BE49-F238E27FC236}">
-                <a16:creationId xmlns:a16="http://schemas.microsoft.com/office/drawing/2014/main" id="{610288D9-B7B8-9916-CE8A-A16E3CD37FDC}"/>
+                <a16:creationId xmlns:a16="http://schemas.microsoft.com/office/drawing/2014/main" id="{F95E0C03-DA09-BCA5-440A-A05C34D99715}"/>
               </a:ext>
             </a:extLst>
           </p:cNvPr>
@@ -11440,10 +12889,16 @@
           <a:lstStyle/>
           <a:p>
             <a:r>
-              <a:rPr lang="en-US" altLang="zh-TW" sz="4400" dirty="0"/>
-              <a:t>Experimental Result</a:t>
-            </a:r>
-            <a:endParaRPr lang="zh-TW" altLang="en-US" dirty="0"/>
+              <a:rPr lang="en-US" altLang="zh-TW" sz="4000" dirty="0">
+                <a:latin typeface="Times" panose="02020603050405020304" pitchFamily="18" charset="0"/>
+                <a:cs typeface="Times" panose="02020603050405020304" pitchFamily="18" charset="0"/>
+              </a:rPr>
+              <a:t>Outline</a:t>
+            </a:r>
+            <a:endParaRPr lang="zh-TW" altLang="en-US" dirty="0">
+              <a:latin typeface="Times" panose="02020603050405020304" pitchFamily="18" charset="0"/>
+              <a:cs typeface="Times" panose="02020603050405020304" pitchFamily="18" charset="0"/>
+            </a:endParaRPr>
           </a:p>
         </p:txBody>
       </p:sp>
@@ -11452,7 +12907,7 @@
           <p:cNvPr id="3" name="內容版面配置區 2">
             <a:extLst>
               <a:ext uri="{FF2B5EF4-FFF2-40B4-BE49-F238E27FC236}">
-                <a16:creationId xmlns:a16="http://schemas.microsoft.com/office/drawing/2014/main" id="{0C8CE807-4736-147A-1173-1E63556B4CF6}"/>
+                <a16:creationId xmlns:a16="http://schemas.microsoft.com/office/drawing/2014/main" id="{F671C038-AE51-E136-6B1E-6C38BF235BBE}"/>
               </a:ext>
             </a:extLst>
           </p:cNvPr>
@@ -11463,13 +12918,219 @@
             <p:ph idx="1"/>
           </p:nvPr>
         </p:nvSpPr>
-        <p:spPr/>
+        <p:spPr bwMode="auto">
+          <a:xfrm>
+            <a:off x="838200" y="1620000"/>
+            <a:ext cx="10515600" cy="4351338"/>
+          </a:xfrm>
+        </p:spPr>
         <p:txBody>
           <a:bodyPr>
             <a:normAutofit/>
           </a:bodyPr>
           <a:lstStyle/>
           <a:p>
+            <a:pPr>
+              <a:lnSpc>
+                <a:spcPct val="150000"/>
+              </a:lnSpc>
+            </a:pPr>
+            <a:r>
+              <a:rPr lang="en-US" altLang="zh-TW" sz="2400" dirty="0"/>
+              <a:t>Introduction</a:t>
+            </a:r>
+          </a:p>
+          <a:p>
+            <a:pPr>
+              <a:lnSpc>
+                <a:spcPct val="150000"/>
+              </a:lnSpc>
+            </a:pPr>
+            <a:r>
+              <a:rPr lang="en-US" altLang="zh-TW" sz="2400" dirty="0">
+                <a:solidFill>
+                  <a:schemeClr val="bg1">
+                    <a:lumMod val="65000"/>
+                  </a:schemeClr>
+                </a:solidFill>
+              </a:rPr>
+              <a:t>Preliminaries</a:t>
+            </a:r>
+          </a:p>
+          <a:p>
+            <a:pPr>
+              <a:lnSpc>
+                <a:spcPct val="150000"/>
+              </a:lnSpc>
+            </a:pPr>
+            <a:r>
+              <a:rPr lang="en-US" altLang="zh-TW" sz="2400" dirty="0">
+                <a:solidFill>
+                  <a:schemeClr val="bg1">
+                    <a:lumMod val="65000"/>
+                  </a:schemeClr>
+                </a:solidFill>
+              </a:rPr>
+              <a:t>Methodology</a:t>
+            </a:r>
+          </a:p>
+          <a:p>
+            <a:pPr>
+              <a:lnSpc>
+                <a:spcPct val="150000"/>
+              </a:lnSpc>
+            </a:pPr>
+            <a:r>
+              <a:rPr lang="en-US" altLang="zh-TW" sz="2400" dirty="0">
+                <a:solidFill>
+                  <a:schemeClr val="bg1">
+                    <a:lumMod val="65000"/>
+                  </a:schemeClr>
+                </a:solidFill>
+              </a:rPr>
+              <a:t>Experimental</a:t>
+            </a:r>
+            <a:r>
+              <a:rPr lang="en-US" altLang="zh-TW" dirty="0">
+                <a:solidFill>
+                  <a:schemeClr val="bg1">
+                    <a:lumMod val="65000"/>
+                  </a:schemeClr>
+                </a:solidFill>
+              </a:rPr>
+              <a:t> </a:t>
+            </a:r>
+            <a:r>
+              <a:rPr lang="en-US" altLang="zh-TW" sz="2400" dirty="0">
+                <a:solidFill>
+                  <a:schemeClr val="bg1">
+                    <a:lumMod val="65000"/>
+                  </a:schemeClr>
+                </a:solidFill>
+              </a:rPr>
+              <a:t>Results</a:t>
+            </a:r>
+            <a:endParaRPr lang="zh-TW" altLang="en-US" dirty="0">
+              <a:solidFill>
+                <a:schemeClr val="bg1">
+                  <a:lumMod val="65000"/>
+                </a:schemeClr>
+              </a:solidFill>
+            </a:endParaRPr>
+          </a:p>
+        </p:txBody>
+      </p:sp>
+      <p:sp>
+        <p:nvSpPr>
+          <p:cNvPr id="4" name="投影片編號版面配置區 3">
+            <a:extLst>
+              <a:ext uri="{FF2B5EF4-FFF2-40B4-BE49-F238E27FC236}">
+                <a16:creationId xmlns:a16="http://schemas.microsoft.com/office/drawing/2014/main" id="{5891B803-9796-C957-1032-D2F5DFAFFD47}"/>
+              </a:ext>
+            </a:extLst>
+          </p:cNvPr>
+          <p:cNvSpPr>
+            <a:spLocks noGrp="1"/>
+          </p:cNvSpPr>
+          <p:nvPr>
+            <p:ph type="sldNum" sz="quarter" idx="12"/>
+          </p:nvPr>
+        </p:nvSpPr>
+        <p:spPr/>
+        <p:txBody>
+          <a:bodyPr/>
+          <a:lstStyle/>
+          <a:p>
+            <a:fld id="{666274A1-CF9C-426A-8DD4-B13ED0C24231}" type="slidenum">
+              <a:rPr lang="en-US" smtClean="0"/>
+              <a:t>2</a:t>
+            </a:fld>
+            <a:endParaRPr lang="en-US"/>
+          </a:p>
+        </p:txBody>
+      </p:sp>
+    </p:spTree>
+    <p:extLst>
+      <p:ext uri="{BB962C8B-B14F-4D97-AF65-F5344CB8AC3E}">
+        <p14:creationId xmlns:p14="http://schemas.microsoft.com/office/powerpoint/2010/main" val="296725533"/>
+      </p:ext>
+    </p:extLst>
+  </p:cSld>
+  <p:clrMapOvr>
+    <a:masterClrMapping/>
+  </p:clrMapOvr>
+</p:sld>
+</file>
+
+<file path=ppt/slides/slide30.xml><?xml version="1.0" encoding="utf-8"?>
+<p:sld xmlns:a="http://schemas.openxmlformats.org/drawingml/2006/main" xmlns:r="http://schemas.openxmlformats.org/officeDocument/2006/relationships" xmlns:p="http://schemas.openxmlformats.org/presentationml/2006/main">
+  <p:cSld>
+    <p:spTree>
+      <p:nvGrpSpPr>
+        <p:cNvPr id="1" name=""/>
+        <p:cNvGrpSpPr/>
+        <p:nvPr/>
+      </p:nvGrpSpPr>
+      <p:grpSpPr>
+        <a:xfrm>
+          <a:off x="0" y="0"/>
+          <a:ext cx="0" cy="0"/>
+          <a:chOff x="0" y="0"/>
+          <a:chExt cx="0" cy="0"/>
+        </a:xfrm>
+      </p:grpSpPr>
+      <p:sp>
+        <p:nvSpPr>
+          <p:cNvPr id="2" name="標題 1">
+            <a:extLst>
+              <a:ext uri="{FF2B5EF4-FFF2-40B4-BE49-F238E27FC236}">
+                <a16:creationId xmlns:a16="http://schemas.microsoft.com/office/drawing/2014/main" id="{610288D9-B7B8-9916-CE8A-A16E3CD37FDC}"/>
+              </a:ext>
+            </a:extLst>
+          </p:cNvPr>
+          <p:cNvSpPr>
+            <a:spLocks noGrp="1"/>
+          </p:cNvSpPr>
+          <p:nvPr>
+            <p:ph type="title"/>
+          </p:nvPr>
+        </p:nvSpPr>
+        <p:spPr/>
+        <p:txBody>
+          <a:bodyPr/>
+          <a:lstStyle/>
+          <a:p>
+            <a:r>
+              <a:rPr lang="en-US" altLang="zh-TW" sz="4400" dirty="0"/>
+              <a:t>Experimental Result</a:t>
+            </a:r>
+            <a:endParaRPr lang="zh-TW" altLang="en-US" dirty="0"/>
+          </a:p>
+        </p:txBody>
+      </p:sp>
+      <p:sp>
+        <p:nvSpPr>
+          <p:cNvPr id="3" name="內容版面配置區 2">
+            <a:extLst>
+              <a:ext uri="{FF2B5EF4-FFF2-40B4-BE49-F238E27FC236}">
+                <a16:creationId xmlns:a16="http://schemas.microsoft.com/office/drawing/2014/main" id="{0C8CE807-4736-147A-1173-1E63556B4CF6}"/>
+              </a:ext>
+            </a:extLst>
+          </p:cNvPr>
+          <p:cNvSpPr>
+            <a:spLocks noGrp="1"/>
+          </p:cNvSpPr>
+          <p:nvPr>
+            <p:ph idx="1"/>
+          </p:nvPr>
+        </p:nvSpPr>
+        <p:spPr/>
+        <p:txBody>
+          <a:bodyPr>
+            <a:normAutofit/>
+          </a:bodyPr>
+          <a:lstStyle/>
+          <a:p>
             <a:r>
               <a:rPr lang="en-US" altLang="zh-TW" sz="2200" dirty="0"/>
               <a:t>Routability improvement (especially for congestion region)</a:t>
@@ -11501,7 +13162,7 @@
           <a:p>
             <a:fld id="{666274A1-CF9C-426A-8DD4-B13ED0C24231}" type="slidenum">
               <a:rPr lang="en-US" smtClean="0"/>
-              <a:t>25</a:t>
+              <a:t>29</a:t>
             </a:fld>
             <a:endParaRPr lang="en-US"/>
           </a:p>
@@ -11550,7 +13211,7 @@
 </p:sld>
 </file>
 
-<file path=ppt/slides/slide27.xml><?xml version="1.0" encoding="utf-8"?>
+<file path=ppt/slides/slide31.xml><?xml version="1.0" encoding="utf-8"?>
 <p:sld xmlns:a="http://schemas.openxmlformats.org/drawingml/2006/main" xmlns:r="http://schemas.openxmlformats.org/officeDocument/2006/relationships" xmlns:p="http://schemas.openxmlformats.org/presentationml/2006/main">
   <p:cSld>
     <p:spTree>
@@ -11669,7 +13330,7 @@
           <a:p>
             <a:fld id="{666274A1-CF9C-426A-8DD4-B13ED0C24231}" type="slidenum">
               <a:rPr lang="en-US" smtClean="0"/>
-              <a:t>26</a:t>
+              <a:t>30</a:t>
             </a:fld>
             <a:endParaRPr lang="en-US"/>
           </a:p>
@@ -11718,7 +13379,7 @@
 </p:sld>
 </file>
 
-<file path=ppt/slides/slide28.xml><?xml version="1.0" encoding="utf-8"?>
+<file path=ppt/slides/slide32.xml><?xml version="1.0" encoding="utf-8"?>
 <p:sld xmlns:a="http://schemas.openxmlformats.org/drawingml/2006/main" xmlns:r="http://schemas.openxmlformats.org/officeDocument/2006/relationships" xmlns:p="http://schemas.openxmlformats.org/presentationml/2006/main">
   <p:cSld>
     <p:spTree>
@@ -11758,7 +13419,7 @@
           <a:p>
             <a:fld id="{666274A1-CF9C-426A-8DD4-B13ED0C24231}" type="slidenum">
               <a:rPr lang="en-US" smtClean="0"/>
-              <a:t>27</a:t>
+              <a:t>31</a:t>
             </a:fld>
             <a:endParaRPr lang="en-US"/>
           </a:p>
@@ -11819,7 +13480,7 @@
 </p:sld>
 </file>
 
-<file path=ppt/slides/slide3.xml><?xml version="1.0" encoding="utf-8"?>
+<file path=ppt/slides/slide4.xml><?xml version="1.0" encoding="utf-8"?>
 <p:sld xmlns:a="http://schemas.openxmlformats.org/drawingml/2006/main" xmlns:r="http://schemas.openxmlformats.org/officeDocument/2006/relationships" xmlns:p="http://schemas.openxmlformats.org/presentationml/2006/main">
   <p:cSld>
     <p:spTree>
@@ -12017,7 +13678,7 @@
           <a:p>
             <a:fld id="{666274A1-CF9C-426A-8DD4-B13ED0C24231}" type="slidenum">
               <a:rPr lang="en-US" smtClean="0"/>
-              <a:t>2</a:t>
+              <a:t>3</a:t>
             </a:fld>
             <a:endParaRPr lang="en-US"/>
           </a:p>
@@ -12142,7 +13803,34 @@
                 </a:solidFill>
                 <a:latin typeface="+mj-lt"/>
               </a:rPr>
-              <a:t>the routing between the secondary power pins on cross-domain cells and power sources</a:t>
+              <a:t>the routing between the secondary power pins </a:t>
+            </a:r>
+            <a:r>
+              <a:rPr lang="en-US" altLang="zh-TW" sz="1800" i="0" u="none" strike="noStrike" baseline="0" dirty="0">
+                <a:solidFill>
+                  <a:srgbClr val="FF0000"/>
+                </a:solidFill>
+                <a:latin typeface="+mj-lt"/>
+              </a:rPr>
+              <a:t>on </a:t>
+            </a:r>
+            <a:r>
+              <a:rPr lang="en-US" altLang="zh-TW" sz="1800" b="1" i="0" u="none" strike="noStrike" baseline="0" dirty="0">
+                <a:solidFill>
+                  <a:srgbClr val="FF0000"/>
+                </a:solidFill>
+                <a:latin typeface="+mj-lt"/>
+              </a:rPr>
+              <a:t>cross-domain cells </a:t>
+            </a:r>
+            <a:r>
+              <a:rPr lang="en-US" altLang="zh-TW" sz="1800" b="0" i="0" u="none" strike="noStrike" baseline="0" dirty="0">
+                <a:solidFill>
+                  <a:srgbClr val="FF0000"/>
+                </a:solidFill>
+                <a:latin typeface="+mj-lt"/>
+              </a:rPr>
+              <a:t>and power sources</a:t>
             </a:r>
             <a:endParaRPr lang="zh-TW" altLang="en-US" dirty="0">
               <a:solidFill>
@@ -12166,7 +13854,7 @@
 </p:sld>
 </file>
 
-<file path=ppt/slides/slide4.xml><?xml version="1.0" encoding="utf-8"?>
+<file path=ppt/slides/slide5.xml><?xml version="1.0" encoding="utf-8"?>
 <p:sld xmlns:a="http://schemas.openxmlformats.org/drawingml/2006/main" xmlns:r="http://schemas.openxmlformats.org/officeDocument/2006/relationships" xmlns:p="http://schemas.openxmlformats.org/presentationml/2006/main">
   <p:cSld>
     <p:spTree>
@@ -12359,7 +14047,7 @@
           <a:p>
             <a:fld id="{666274A1-CF9C-426A-8DD4-B13ED0C24231}" type="slidenum">
               <a:rPr lang="en-US" smtClean="0"/>
-              <a:t>3</a:t>
+              <a:t>4</a:t>
             </a:fld>
             <a:endParaRPr lang="en-US"/>
           </a:p>
@@ -12436,7 +14124,7 @@
 </p:sld>
 </file>
 
-<file path=ppt/slides/slide5.xml><?xml version="1.0" encoding="utf-8"?>
+<file path=ppt/slides/slide6.xml><?xml version="1.0" encoding="utf-8"?>
 <p:sld xmlns:a="http://schemas.openxmlformats.org/drawingml/2006/main" xmlns:r="http://schemas.openxmlformats.org/officeDocument/2006/relationships" xmlns:p="http://schemas.openxmlformats.org/presentationml/2006/main">
   <p:cSld>
     <p:spTree>
@@ -12570,7 +14258,7 @@
           <a:p>
             <a:fld id="{666274A1-CF9C-426A-8DD4-B13ED0C24231}" type="slidenum">
               <a:rPr lang="en-US" smtClean="0"/>
-              <a:t>4</a:t>
+              <a:t>5</a:t>
             </a:fld>
             <a:endParaRPr lang="en-US"/>
           </a:p>
@@ -12619,7 +14307,7 @@
 </p:sld>
 </file>
 
-<file path=ppt/slides/slide6.xml><?xml version="1.0" encoding="utf-8"?>
+<file path=ppt/slides/slide7.xml><?xml version="1.0" encoding="utf-8"?>
 <p:sld xmlns:a="http://schemas.openxmlformats.org/drawingml/2006/main" xmlns:r="http://schemas.openxmlformats.org/officeDocument/2006/relationships" xmlns:p="http://schemas.openxmlformats.org/presentationml/2006/main">
   <p:cSld>
     <p:spTree>
@@ -12719,7 +14407,7 @@
           <a:p>
             <a:fld id="{666274A1-CF9C-426A-8DD4-B13ED0C24231}" type="slidenum">
               <a:rPr lang="en-US" smtClean="0"/>
-              <a:t>5</a:t>
+              <a:t>6</a:t>
             </a:fld>
             <a:endParaRPr lang="en-US"/>
           </a:p>
@@ -12768,230 +14456,6 @@
 </p:sld>
 </file>
 
-<file path=ppt/slides/slide7.xml><?xml version="1.0" encoding="utf-8"?>
-<p:sld xmlns:a="http://schemas.openxmlformats.org/drawingml/2006/main" xmlns:r="http://schemas.openxmlformats.org/officeDocument/2006/relationships" xmlns:p="http://schemas.openxmlformats.org/presentationml/2006/main">
-  <p:cSld>
-    <p:spTree>
-      <p:nvGrpSpPr>
-        <p:cNvPr id="1" name=""/>
-        <p:cNvGrpSpPr/>
-        <p:nvPr/>
-      </p:nvGrpSpPr>
-      <p:grpSpPr>
-        <a:xfrm>
-          <a:off x="0" y="0"/>
-          <a:ext cx="0" cy="0"/>
-          <a:chOff x="0" y="0"/>
-          <a:chExt cx="0" cy="0"/>
-        </a:xfrm>
-      </p:grpSpPr>
-      <p:sp>
-        <p:nvSpPr>
-          <p:cNvPr id="2" name="標題 1">
-            <a:extLst>
-              <a:ext uri="{FF2B5EF4-FFF2-40B4-BE49-F238E27FC236}">
-                <a16:creationId xmlns:a16="http://schemas.microsoft.com/office/drawing/2014/main" id="{AE5CDEBA-F7CB-4423-D17F-78C9E7A6B544}"/>
-              </a:ext>
-            </a:extLst>
-          </p:cNvPr>
-          <p:cNvSpPr>
-            <a:spLocks noGrp="1"/>
-          </p:cNvSpPr>
-          <p:nvPr>
-            <p:ph type="title"/>
-          </p:nvPr>
-        </p:nvSpPr>
-        <p:spPr/>
-        <p:txBody>
-          <a:bodyPr/>
-          <a:lstStyle/>
-          <a:p>
-            <a:r>
-              <a:rPr lang="en-US" altLang="zh-TW" sz="4000" dirty="0">
-                <a:latin typeface="Times" panose="02020603050405020304" pitchFamily="18" charset="0"/>
-                <a:cs typeface="Times" panose="02020603050405020304" pitchFamily="18" charset="0"/>
-              </a:rPr>
-              <a:t>Introduction</a:t>
-            </a:r>
-            <a:endParaRPr lang="zh-TW" altLang="en-US" dirty="0">
-              <a:latin typeface="Times" panose="02020603050405020304" pitchFamily="18" charset="0"/>
-              <a:cs typeface="Times" panose="02020603050405020304" pitchFamily="18" charset="0"/>
-            </a:endParaRPr>
-          </a:p>
-        </p:txBody>
-      </p:sp>
-      <p:sp>
-        <p:nvSpPr>
-          <p:cNvPr id="3" name="內容版面配置區 2">
-            <a:extLst>
-              <a:ext uri="{FF2B5EF4-FFF2-40B4-BE49-F238E27FC236}">
-                <a16:creationId xmlns:a16="http://schemas.microsoft.com/office/drawing/2014/main" id="{2BF1C42E-208D-D375-D779-4FE5706E52D6}"/>
-              </a:ext>
-            </a:extLst>
-          </p:cNvPr>
-          <p:cNvSpPr>
-            <a:spLocks noGrp="1"/>
-          </p:cNvSpPr>
-          <p:nvPr>
-            <p:ph idx="1"/>
-          </p:nvPr>
-        </p:nvSpPr>
-        <p:spPr>
-          <a:xfrm>
-            <a:off x="838200" y="1620000"/>
-            <a:ext cx="10515600" cy="4895850"/>
-          </a:xfrm>
-        </p:spPr>
-        <p:txBody>
-          <a:bodyPr>
-            <a:normAutofit/>
-          </a:bodyPr>
-          <a:lstStyle/>
-          <a:p>
-            <a:pPr>
-              <a:lnSpc>
-                <a:spcPct val="150000"/>
-              </a:lnSpc>
-            </a:pPr>
-            <a:r>
-              <a:rPr lang="en-US" altLang="zh-TW" sz="2200" dirty="0"/>
-              <a:t>Starts with a full sub-mesh with the best IR drop, and repeatedly removes unnecessary sub-meshes.</a:t>
-            </a:r>
-          </a:p>
-          <a:p>
-            <a:pPr lvl="1">
-              <a:lnSpc>
-                <a:spcPct val="150000"/>
-              </a:lnSpc>
-            </a:pPr>
-            <a:r>
-              <a:rPr lang="en-US" altLang="zh-TW" sz="1800" dirty="0"/>
-              <a:t>Until the IR drop constraint cannot be satisfied.</a:t>
-            </a:r>
-          </a:p>
-          <a:p>
-            <a:pPr lvl="1">
-              <a:lnSpc>
-                <a:spcPct val="150000"/>
-              </a:lnSpc>
-            </a:pPr>
-            <a:r>
-              <a:rPr lang="en-US" altLang="zh-TW" sz="1800" dirty="0"/>
-              <a:t>While the IR drop analysis in each iteration is time-consuming.</a:t>
-            </a:r>
-          </a:p>
-          <a:p>
-            <a:pPr lvl="1">
-              <a:lnSpc>
-                <a:spcPct val="150000"/>
-              </a:lnSpc>
-            </a:pPr>
-            <a:endParaRPr lang="en-US" altLang="zh-TW" sz="100" dirty="0"/>
-          </a:p>
-          <a:p>
-            <a:pPr>
-              <a:lnSpc>
-                <a:spcPct val="150000"/>
-              </a:lnSpc>
-            </a:pPr>
-            <a:r>
-              <a:rPr lang="en-US" altLang="zh-TW" sz="2200" dirty="0"/>
-              <a:t>They train two models under power sub-meshes of various densities.</a:t>
-            </a:r>
-          </a:p>
-          <a:p>
-            <a:pPr lvl="1">
-              <a:lnSpc>
-                <a:spcPct val="150000"/>
-              </a:lnSpc>
-            </a:pPr>
-            <a:r>
-              <a:rPr lang="en-US" altLang="zh-TW" sz="1800" dirty="0"/>
-              <a:t>IR drop prediction model</a:t>
-            </a:r>
-          </a:p>
-          <a:p>
-            <a:pPr lvl="1">
-              <a:lnSpc>
-                <a:spcPct val="150000"/>
-              </a:lnSpc>
-            </a:pPr>
-            <a:r>
-              <a:rPr lang="en-US" altLang="zh-TW" sz="1800" dirty="0"/>
-              <a:t>Design rule violation prediction model</a:t>
-            </a:r>
-          </a:p>
-          <a:p>
-            <a:pPr lvl="1">
-              <a:lnSpc>
-                <a:spcPct val="150000"/>
-              </a:lnSpc>
-            </a:pPr>
-            <a:endParaRPr lang="en-US" altLang="zh-TW" sz="100" dirty="0"/>
-          </a:p>
-          <a:p>
-            <a:pPr>
-              <a:lnSpc>
-                <a:spcPct val="125000"/>
-              </a:lnSpc>
-            </a:pPr>
-            <a:r>
-              <a:rPr lang="en-US" altLang="zh-TW" sz="2200" dirty="0"/>
-              <a:t>The trained models effectively guide sub-mesh construction for cross-domain cells to budget the routing resource usage on secondary power routing and signal routing.</a:t>
-            </a:r>
-          </a:p>
-          <a:p>
-            <a:pPr>
-              <a:lnSpc>
-                <a:spcPct val="150000"/>
-              </a:lnSpc>
-            </a:pPr>
-            <a:endParaRPr lang="en-US" altLang="zh-TW" sz="2200" dirty="0"/>
-          </a:p>
-        </p:txBody>
-      </p:sp>
-      <p:sp>
-        <p:nvSpPr>
-          <p:cNvPr id="4" name="投影片編號版面配置區 3">
-            <a:extLst>
-              <a:ext uri="{FF2B5EF4-FFF2-40B4-BE49-F238E27FC236}">
-                <a16:creationId xmlns:a16="http://schemas.microsoft.com/office/drawing/2014/main" id="{75FE7E51-3153-478A-D8A4-7E30B3D4AF4C}"/>
-              </a:ext>
-            </a:extLst>
-          </p:cNvPr>
-          <p:cNvSpPr>
-            <a:spLocks noGrp="1"/>
-          </p:cNvSpPr>
-          <p:nvPr>
-            <p:ph type="sldNum" sz="quarter" idx="12"/>
-          </p:nvPr>
-        </p:nvSpPr>
-        <p:spPr/>
-        <p:txBody>
-          <a:bodyPr/>
-          <a:lstStyle/>
-          <a:p>
-            <a:fld id="{666274A1-CF9C-426A-8DD4-B13ED0C24231}" type="slidenum">
-              <a:rPr lang="en-US" smtClean="0"/>
-              <a:t>6</a:t>
-            </a:fld>
-            <a:endParaRPr lang="en-US"/>
-          </a:p>
-        </p:txBody>
-      </p:sp>
-    </p:spTree>
-    <p:extLst>
-      <p:ext uri="{BB962C8B-B14F-4D97-AF65-F5344CB8AC3E}">
-        <p14:creationId xmlns:p14="http://schemas.microsoft.com/office/powerpoint/2010/main" val="3288152618"/>
-      </p:ext>
-    </p:extLst>
-  </p:cSld>
-  <p:clrMapOvr>
-    <a:masterClrMapping/>
-  </p:clrMapOvr>
-</p:sld>
-</file>
-
 <file path=ppt/slides/slide8.xml><?xml version="1.0" encoding="utf-8"?>
 <p:sld xmlns:a="http://schemas.openxmlformats.org/drawingml/2006/main" xmlns:r="http://schemas.openxmlformats.org/officeDocument/2006/relationships" xmlns:p="http://schemas.openxmlformats.org/presentationml/2006/main">
   <p:cSld>
@@ -13035,7 +14499,7 @@
                 <a:latin typeface="Times" panose="02020603050405020304" pitchFamily="18" charset="0"/>
                 <a:cs typeface="Times" panose="02020603050405020304" pitchFamily="18" charset="0"/>
               </a:rPr>
-              <a:t>Preliminaries</a:t>
+              <a:t>Introduction</a:t>
             </a:r>
             <a:endParaRPr lang="zh-TW" altLang="en-US" dirty="0">
               <a:latin typeface="Times" panose="02020603050405020304" pitchFamily="18" charset="0"/>
@@ -13062,8 +14526,8 @@
         </p:nvSpPr>
         <p:spPr>
           <a:xfrm>
-            <a:off x="838200" y="1619999"/>
-            <a:ext cx="10515600" cy="5101475"/>
+            <a:off x="838200" y="1620000"/>
+            <a:ext cx="10515600" cy="4895850"/>
           </a:xfrm>
         </p:spPr>
         <p:txBody>
@@ -13078,10 +14542,8 @@
               </a:lnSpc>
             </a:pPr>
             <a:r>
-              <a:rPr lang="en-US" altLang="zh-TW" sz="2200" dirty="0">
-                <a:latin typeface="+mj-lt"/>
-              </a:rPr>
-              <a:t>Power Domain</a:t>
+              <a:rPr lang="en-US" altLang="zh-TW" sz="2200" dirty="0"/>
+              <a:t>Starts with a full sub-mesh with the best IR drop, and repeatedly removes unnecessary sub-meshes.</a:t>
             </a:r>
           </a:p>
           <a:p>
@@ -13091,10 +14553,8 @@
               </a:lnSpc>
             </a:pPr>
             <a:r>
-              <a:rPr lang="en-US" altLang="zh-TW" sz="1800" dirty="0">
-                <a:latin typeface="+mj-lt"/>
-              </a:rPr>
-              <a:t>A collection of cells that use the same power supply during normal operation.</a:t>
+              <a:rPr lang="en-US" altLang="zh-TW" sz="1800" dirty="0"/>
+              <a:t>Until the IR drop constraint cannot be satisfied.</a:t>
             </a:r>
           </a:p>
           <a:p>
@@ -13104,10 +14564,8 @@
               </a:lnSpc>
             </a:pPr>
             <a:r>
-              <a:rPr lang="en-US" altLang="zh-TW" sz="1800" dirty="0">
-                <a:latin typeface="+mj-lt"/>
-              </a:rPr>
-              <a:t>Can be switched on or off at the same time.</a:t>
+              <a:rPr lang="en-US" altLang="zh-TW" sz="1800" dirty="0"/>
+              <a:t>While the IR drop analysis in each iteration is time-consuming.</a:t>
             </a:r>
           </a:p>
           <a:p>
@@ -13116,9 +14574,7 @@
                 <a:spcPct val="150000"/>
               </a:lnSpc>
             </a:pPr>
-            <a:endParaRPr lang="en-US" altLang="zh-TW" sz="100" dirty="0">
-              <a:latin typeface="+mj-lt"/>
-            </a:endParaRPr>
+            <a:endParaRPr lang="en-US" altLang="zh-TW" sz="100" dirty="0"/>
           </a:p>
           <a:p>
             <a:pPr>
@@ -13127,10 +14583,8 @@
               </a:lnSpc>
             </a:pPr>
             <a:r>
-              <a:rPr lang="en-US" altLang="zh-TW" sz="2200" dirty="0">
-                <a:latin typeface="+mj-lt"/>
-              </a:rPr>
-              <a:t>There are numerous multiple power domain cells (cross domain cells)</a:t>
+              <a:rPr lang="en-US" altLang="zh-TW" sz="2200" dirty="0"/>
+              <a:t>They train two models under power sub-meshes of various densities.</a:t>
             </a:r>
           </a:p>
           <a:p>
@@ -13140,10 +14594,8 @@
               </a:lnSpc>
             </a:pPr>
             <a:r>
-              <a:rPr lang="en-US" altLang="zh-TW" sz="1800" dirty="0">
-                <a:latin typeface="+mj-lt"/>
-              </a:rPr>
-              <a:t>Always-on buffers/inverters, retention flip-flops, isolation cells.</a:t>
+              <a:rPr lang="en-US" altLang="zh-TW" sz="1800" dirty="0"/>
+              <a:t>IR drop prediction model</a:t>
             </a:r>
           </a:p>
           <a:p>
@@ -13153,10 +14605,8 @@
               </a:lnSpc>
             </a:pPr>
             <a:r>
-              <a:rPr lang="en-US" altLang="zh-TW" sz="1800" dirty="0">
-                <a:latin typeface="+mj-lt"/>
-              </a:rPr>
-              <a:t>There pins called secondary power pin.</a:t>
+              <a:rPr lang="en-US" altLang="zh-TW" sz="1800" dirty="0"/>
+              <a:t>Design rule violation prediction model</a:t>
             </a:r>
           </a:p>
           <a:p>
@@ -13165,9 +14615,18 @@
                 <a:spcPct val="150000"/>
               </a:lnSpc>
             </a:pPr>
-            <a:endParaRPr lang="en-US" altLang="zh-TW" sz="100" dirty="0">
-              <a:latin typeface="+mj-lt"/>
-            </a:endParaRPr>
+            <a:endParaRPr lang="en-US" altLang="zh-TW" sz="100" dirty="0"/>
+          </a:p>
+          <a:p>
+            <a:pPr>
+              <a:lnSpc>
+                <a:spcPct val="125000"/>
+              </a:lnSpc>
+            </a:pPr>
+            <a:r>
+              <a:rPr lang="en-US" altLang="zh-TW" sz="2200" dirty="0"/>
+              <a:t>The trained models effectively guide sub-mesh construction for cross-domain cells to budget the routing resource usage on secondary power routing and signal routing.</a:t>
+            </a:r>
           </a:p>
           <a:p>
             <a:pPr>
@@ -13175,60 +14634,7 @@
                 <a:spcPct val="150000"/>
               </a:lnSpc>
             </a:pPr>
-            <a:r>
-              <a:rPr lang="en-US" altLang="zh-TW" sz="2200" dirty="0">
-                <a:latin typeface="+mj-lt"/>
-              </a:rPr>
-              <a:t>There are 2 types of power source for a cross-domain cell</a:t>
-            </a:r>
-          </a:p>
-          <a:p>
-            <a:pPr lvl="1">
-              <a:lnSpc>
-                <a:spcPct val="150000"/>
-              </a:lnSpc>
-            </a:pPr>
-            <a:r>
-              <a:rPr lang="en-US" altLang="zh-TW" sz="1800" u="sng" dirty="0">
-                <a:latin typeface="+mj-lt"/>
-              </a:rPr>
-              <a:t>Direct supply</a:t>
-            </a:r>
-            <a:r>
-              <a:rPr lang="en-US" altLang="zh-TW" sz="1800" dirty="0">
-                <a:latin typeface="+mj-lt"/>
-              </a:rPr>
-              <a:t>:    primary power mesh directly supplies power to the cross-domain cells.</a:t>
-            </a:r>
-          </a:p>
-          <a:p>
-            <a:pPr lvl="1">
-              <a:lnSpc>
-                <a:spcPct val="150000"/>
-              </a:lnSpc>
-            </a:pPr>
-            <a:r>
-              <a:rPr lang="en-US" altLang="zh-TW" sz="1800" u="sng" dirty="0">
-                <a:latin typeface="+mj-lt"/>
-              </a:rPr>
-              <a:t>Indirect supply</a:t>
-            </a:r>
-            <a:r>
-              <a:rPr lang="en-US" altLang="zh-TW" sz="1800" dirty="0">
-                <a:latin typeface="+mj-lt"/>
-              </a:rPr>
-              <a:t>:  power gating cell (MTCMOS), level shifter.</a:t>
-            </a:r>
-          </a:p>
-          <a:p>
-            <a:pPr lvl="1">
-              <a:lnSpc>
-                <a:spcPct val="150000"/>
-              </a:lnSpc>
-            </a:pPr>
-            <a:endParaRPr lang="en-US" altLang="zh-TW" sz="1800" dirty="0">
-              <a:latin typeface="+mj-lt"/>
-            </a:endParaRPr>
+            <a:endParaRPr lang="en-US" altLang="zh-TW" sz="2200" dirty="0"/>
           </a:p>
         </p:txBody>
       </p:sp>
@@ -13264,7 +14670,7 @@
     </p:spTree>
     <p:extLst>
       <p:ext uri="{BB962C8B-B14F-4D97-AF65-F5344CB8AC3E}">
-        <p14:creationId xmlns:p14="http://schemas.microsoft.com/office/powerpoint/2010/main" val="1133187789"/>
+        <p14:creationId xmlns:p14="http://schemas.microsoft.com/office/powerpoint/2010/main" val="3288152618"/>
       </p:ext>
     </p:extLst>
   </p:cSld>
@@ -13296,7 +14702,7 @@
           <p:cNvPr id="2" name="標題 1">
             <a:extLst>
               <a:ext uri="{FF2B5EF4-FFF2-40B4-BE49-F238E27FC236}">
-                <a16:creationId xmlns:a16="http://schemas.microsoft.com/office/drawing/2014/main" id="{AE5CDEBA-F7CB-4423-D17F-78C9E7A6B544}"/>
+                <a16:creationId xmlns:a16="http://schemas.microsoft.com/office/drawing/2014/main" id="{F95E0C03-DA09-BCA5-440A-A05C34D99715}"/>
               </a:ext>
             </a:extLst>
           </p:cNvPr>
@@ -13317,7 +14723,7 @@
                 <a:latin typeface="Times" panose="02020603050405020304" pitchFamily="18" charset="0"/>
                 <a:cs typeface="Times" panose="02020603050405020304" pitchFamily="18" charset="0"/>
               </a:rPr>
-              <a:t>Preliminaries</a:t>
+              <a:t>Outline</a:t>
             </a:r>
             <a:endParaRPr lang="zh-TW" altLang="en-US" dirty="0">
               <a:latin typeface="Times" panose="02020603050405020304" pitchFamily="18" charset="0"/>
@@ -13326,390 +14732,130 @@
           </a:p>
         </p:txBody>
       </p:sp>
-      <mc:AlternateContent xmlns:mc="http://schemas.openxmlformats.org/markup-compatibility/2006" xmlns:a14="http://schemas.microsoft.com/office/drawing/2010/main">
-        <mc:Choice Requires="a14">
-          <p:sp>
-            <p:nvSpPr>
-              <p:cNvPr id="3" name="內容版面配置區 2">
-                <a:extLst>
-                  <a:ext uri="{FF2B5EF4-FFF2-40B4-BE49-F238E27FC236}">
-                    <a16:creationId xmlns:a16="http://schemas.microsoft.com/office/drawing/2014/main" id="{2BF1C42E-208D-D375-D779-4FE5706E52D6}"/>
-                  </a:ext>
-                </a:extLst>
-              </p:cNvPr>
-              <p:cNvSpPr>
-                <a:spLocks noGrp="1"/>
-              </p:cNvSpPr>
-              <p:nvPr>
-                <p:ph idx="1"/>
-              </p:nvPr>
-            </p:nvSpPr>
-            <p:spPr>
-              <a:xfrm>
-                <a:off x="838200" y="1620000"/>
-                <a:ext cx="10515600" cy="4895850"/>
-              </a:xfrm>
-            </p:spPr>
-            <p:txBody>
-              <a:bodyPr>
-                <a:normAutofit/>
-              </a:bodyPr>
-              <a:lstStyle/>
-              <a:p>
-                <a:pPr>
-                  <a:lnSpc>
-                    <a:spcPct val="150000"/>
-                  </a:lnSpc>
-                </a:pPr>
-                <a:r>
-                  <a:rPr lang="en-US" altLang="zh-TW" sz="2200" dirty="0">
-                    <a:latin typeface="+mj-lt"/>
-                  </a:rPr>
-                  <a:t>Static IR drop:</a:t>
-                </a:r>
-              </a:p>
-              <a:p>
-                <a:pPr lvl="1">
-                  <a:lnSpc>
-                    <a:spcPct val="150000"/>
-                  </a:lnSpc>
-                </a:pPr>
-                <a:r>
-                  <a:rPr lang="en-US" altLang="zh-TW" sz="1800" dirty="0">
-                    <a:latin typeface="+mj-lt"/>
-                  </a:rPr>
-                  <a:t>Measure the weakness of the overall power delivery network.</a:t>
-                </a:r>
-              </a:p>
-              <a:p>
-                <a:pPr lvl="1">
-                  <a:lnSpc>
-                    <a:spcPct val="150000"/>
-                  </a:lnSpc>
-                </a:pPr>
-                <a14:m>
-                  <m:oMath xmlns:m="http://schemas.openxmlformats.org/officeDocument/2006/math">
-                    <m:sSub>
-                      <m:sSubPr>
-                        <m:ctrlPr>
-                          <a:rPr lang="en-US" altLang="zh-TW" sz="1800" i="1" smtClean="0">
-                            <a:latin typeface="Cambria Math" panose="02040503050406030204" pitchFamily="18" charset="0"/>
-                          </a:rPr>
-                        </m:ctrlPr>
-                      </m:sSubPr>
-                      <m:e>
-                        <m:r>
-                          <a:rPr lang="en-US" altLang="zh-TW" sz="1800" b="0" i="1" smtClean="0">
-                            <a:latin typeface="Cambria Math" panose="02040503050406030204" pitchFamily="18" charset="0"/>
-                          </a:rPr>
-                          <m:t>𝑉</m:t>
-                        </m:r>
-                      </m:e>
-                      <m:sub>
-                        <m:r>
-                          <a:rPr lang="en-US" altLang="zh-TW" sz="1800" b="0" i="1" smtClean="0">
-                            <a:latin typeface="Cambria Math" panose="02040503050406030204" pitchFamily="18" charset="0"/>
-                          </a:rPr>
-                          <m:t>𝑠𝑡𝑎𝑡𝑖𝑐</m:t>
-                        </m:r>
-                        <m:r>
-                          <a:rPr lang="en-US" altLang="zh-TW" sz="1800" b="0" i="1" smtClean="0">
-                            <a:latin typeface="Cambria Math" panose="02040503050406030204" pitchFamily="18" charset="0"/>
-                          </a:rPr>
-                          <m:t>_</m:t>
-                        </m:r>
-                        <m:r>
-                          <a:rPr lang="en-US" altLang="zh-TW" sz="1800" b="0" i="1" smtClean="0">
-                            <a:latin typeface="Cambria Math" panose="02040503050406030204" pitchFamily="18" charset="0"/>
-                          </a:rPr>
-                          <m:t>𝑑𝑟𝑜𝑝</m:t>
-                        </m:r>
-                      </m:sub>
-                    </m:sSub>
-                    <m:r>
-                      <a:rPr lang="en-US" altLang="zh-TW" sz="1800" b="0" i="1" smtClean="0">
-                        <a:latin typeface="Cambria Math" panose="02040503050406030204" pitchFamily="18" charset="0"/>
-                      </a:rPr>
-                      <m:t>= </m:t>
-                    </m:r>
-                    <m:sSub>
-                      <m:sSubPr>
-                        <m:ctrlPr>
-                          <a:rPr lang="en-US" altLang="zh-TW" sz="1800" b="0" i="1" smtClean="0">
-                            <a:latin typeface="Cambria Math" panose="02040503050406030204" pitchFamily="18" charset="0"/>
-                          </a:rPr>
-                        </m:ctrlPr>
-                      </m:sSubPr>
-                      <m:e>
-                        <m:r>
-                          <a:rPr lang="en-US" altLang="zh-TW" sz="1800" b="0" i="1" smtClean="0">
-                            <a:latin typeface="Cambria Math" panose="02040503050406030204" pitchFamily="18" charset="0"/>
-                          </a:rPr>
-                          <m:t>𝐼</m:t>
-                        </m:r>
-                      </m:e>
-                      <m:sub>
-                        <m:r>
-                          <a:rPr lang="en-US" altLang="zh-TW" sz="1800" b="0" i="1" smtClean="0">
-                            <a:latin typeface="Cambria Math" panose="02040503050406030204" pitchFamily="18" charset="0"/>
-                          </a:rPr>
-                          <m:t>𝑎𝑣𝑔</m:t>
-                        </m:r>
-                      </m:sub>
-                    </m:sSub>
-                    <m:r>
-                      <a:rPr lang="en-US" altLang="zh-TW" sz="1800" b="0" i="1" smtClean="0">
-                        <a:latin typeface="Cambria Math" panose="02040503050406030204" pitchFamily="18" charset="0"/>
-                      </a:rPr>
-                      <m:t> </m:t>
-                    </m:r>
-                    <m:r>
-                      <a:rPr lang="en-US" altLang="zh-TW" sz="1800" b="0" i="1" smtClean="0">
-                        <a:latin typeface="Cambria Math" panose="02040503050406030204" pitchFamily="18" charset="0"/>
-                        <a:ea typeface="Cambria Math" panose="02040503050406030204" pitchFamily="18" charset="0"/>
-                      </a:rPr>
-                      <m:t>× </m:t>
-                    </m:r>
-                    <m:sSub>
-                      <m:sSubPr>
-                        <m:ctrlPr>
-                          <a:rPr lang="en-US" altLang="zh-TW" sz="1800" b="0" i="1" smtClean="0">
-                            <a:latin typeface="Cambria Math" panose="02040503050406030204" pitchFamily="18" charset="0"/>
-                            <a:ea typeface="Cambria Math" panose="02040503050406030204" pitchFamily="18" charset="0"/>
-                          </a:rPr>
-                        </m:ctrlPr>
-                      </m:sSubPr>
-                      <m:e>
-                        <m:r>
-                          <a:rPr lang="en-US" altLang="zh-TW" sz="1800" b="0" i="1" smtClean="0">
-                            <a:latin typeface="Cambria Math" panose="02040503050406030204" pitchFamily="18" charset="0"/>
-                            <a:ea typeface="Cambria Math" panose="02040503050406030204" pitchFamily="18" charset="0"/>
-                          </a:rPr>
-                          <m:t>𝑅</m:t>
-                        </m:r>
-                      </m:e>
-                      <m:sub>
-                        <m:r>
-                          <a:rPr lang="en-US" altLang="zh-TW" sz="1800" b="0" i="1" smtClean="0">
-                            <a:latin typeface="Cambria Math" panose="02040503050406030204" pitchFamily="18" charset="0"/>
-                            <a:ea typeface="Cambria Math" panose="02040503050406030204" pitchFamily="18" charset="0"/>
-                          </a:rPr>
-                          <m:t>𝑤𝑖𝑟𝑒</m:t>
-                        </m:r>
-                      </m:sub>
-                    </m:sSub>
-                  </m:oMath>
-                </a14:m>
-                <a:endParaRPr lang="en-US" altLang="zh-TW" sz="1800" dirty="0">
-                  <a:latin typeface="+mj-lt"/>
-                </a:endParaRPr>
-              </a:p>
-              <a:p>
-                <a:pPr lvl="2">
-                  <a:lnSpc>
-                    <a:spcPct val="150000"/>
-                  </a:lnSpc>
-                </a:pPr>
-                <a14:m>
-                  <m:oMath xmlns:m="http://schemas.openxmlformats.org/officeDocument/2006/math">
-                    <m:sSub>
-                      <m:sSubPr>
-                        <m:ctrlPr>
-                          <a:rPr lang="en-US" altLang="zh-TW" sz="1600" i="1" smtClean="0">
-                            <a:latin typeface="Cambria Math" panose="02040503050406030204" pitchFamily="18" charset="0"/>
-                          </a:rPr>
-                        </m:ctrlPr>
-                      </m:sSubPr>
-                      <m:e>
-                        <m:r>
-                          <a:rPr lang="en-US" altLang="zh-TW" sz="1600" b="0" i="1" smtClean="0">
-                            <a:latin typeface="Cambria Math" panose="02040503050406030204" pitchFamily="18" charset="0"/>
-                          </a:rPr>
-                          <m:t>𝐼</m:t>
-                        </m:r>
-                      </m:e>
-                      <m:sub>
-                        <m:r>
-                          <a:rPr lang="en-US" altLang="zh-TW" sz="1600" b="0" i="1" smtClean="0">
-                            <a:latin typeface="Cambria Math" panose="02040503050406030204" pitchFamily="18" charset="0"/>
-                          </a:rPr>
-                          <m:t>𝑎𝑣𝑔</m:t>
-                        </m:r>
-                      </m:sub>
-                    </m:sSub>
-                    <m:r>
-                      <a:rPr lang="en-US" altLang="zh-TW" sz="1600" b="0" i="1" smtClean="0">
-                        <a:latin typeface="Cambria Math" panose="02040503050406030204" pitchFamily="18" charset="0"/>
-                      </a:rPr>
-                      <m:t>: </m:t>
-                    </m:r>
-                  </m:oMath>
-                </a14:m>
-                <a:r>
-                  <a:rPr lang="en-US" altLang="zh-TW" sz="1600" b="0" i="0" dirty="0">
-                    <a:latin typeface="+mj-lt"/>
-                  </a:rPr>
-                  <a:t>   The average current drawn from PDN under average switching rate.</a:t>
-                </a:r>
-              </a:p>
-              <a:p>
-                <a:pPr lvl="2">
-                  <a:lnSpc>
-                    <a:spcPct val="150000"/>
-                  </a:lnSpc>
-                </a:pPr>
-                <a14:m>
-                  <m:oMath xmlns:m="http://schemas.openxmlformats.org/officeDocument/2006/math">
-                    <m:sSub>
-                      <m:sSubPr>
-                        <m:ctrlPr>
-                          <a:rPr lang="en-US" altLang="zh-TW" sz="1600" i="1" smtClean="0">
-                            <a:latin typeface="Cambria Math" panose="02040503050406030204" pitchFamily="18" charset="0"/>
-                          </a:rPr>
-                        </m:ctrlPr>
-                      </m:sSubPr>
-                      <m:e>
-                        <m:r>
-                          <a:rPr lang="en-US" altLang="zh-TW" sz="1600" b="0" i="1" smtClean="0">
-                            <a:latin typeface="Cambria Math" panose="02040503050406030204" pitchFamily="18" charset="0"/>
-                          </a:rPr>
-                          <m:t>𝑅</m:t>
-                        </m:r>
-                      </m:e>
-                      <m:sub>
-                        <m:r>
-                          <a:rPr lang="en-US" altLang="zh-TW" sz="1600" b="0" i="1" smtClean="0">
-                            <a:latin typeface="Cambria Math" panose="02040503050406030204" pitchFamily="18" charset="0"/>
-                          </a:rPr>
-                          <m:t>𝑤𝑖𝑟𝑒</m:t>
-                        </m:r>
-                      </m:sub>
-                    </m:sSub>
-                    <m:r>
-                      <a:rPr lang="en-US" altLang="zh-TW" sz="1600" b="0" i="1" smtClean="0">
-                        <a:latin typeface="Cambria Math" panose="02040503050406030204" pitchFamily="18" charset="0"/>
-                      </a:rPr>
-                      <m:t>:</m:t>
-                    </m:r>
-                  </m:oMath>
-                </a14:m>
-                <a:r>
-                  <a:rPr lang="en-US" altLang="zh-TW" sz="1600" b="0" i="0" dirty="0">
-                    <a:latin typeface="+mj-lt"/>
-                  </a:rPr>
-                  <a:t>  E</a:t>
-                </a:r>
-                <a:r>
-                  <a:rPr lang="en-US" altLang="zh-TW" sz="1600" dirty="0">
-                    <a:latin typeface="+mj-lt"/>
-                  </a:rPr>
-                  <a:t>ffective resistance from the power source to the location of interest in the layout.</a:t>
-                </a:r>
-              </a:p>
-              <a:p>
-                <a:pPr>
-                  <a:lnSpc>
-                    <a:spcPct val="150000"/>
-                  </a:lnSpc>
-                </a:pPr>
-                <a:r>
-                  <a:rPr lang="en-US" altLang="zh-TW" sz="2200" dirty="0">
-                    <a:latin typeface="+mj-lt"/>
-                  </a:rPr>
-                  <a:t>Usually route power source and the secondary power pin of a cross-domain cell with wider metal</a:t>
-                </a:r>
-                <a:r>
-                  <a:rPr lang="zh-TW" altLang="en-US" sz="2200" dirty="0">
-                    <a:latin typeface="+mj-lt"/>
-                  </a:rPr>
-                  <a:t> </a:t>
-                </a:r>
-                <a:r>
-                  <a:rPr lang="en-US" altLang="zh-TW" sz="2200" dirty="0">
-                    <a:latin typeface="+mj-lt"/>
-                  </a:rPr>
-                  <a:t>than signal routing.</a:t>
-                </a:r>
-              </a:p>
-              <a:p>
-                <a:pPr lvl="1">
-                  <a:lnSpc>
-                    <a:spcPct val="150000"/>
-                  </a:lnSpc>
-                </a:pPr>
-                <a:r>
-                  <a:rPr lang="en-US" altLang="zh-TW" sz="1800" dirty="0">
-                    <a:latin typeface="+mj-lt"/>
-                  </a:rPr>
-                  <a:t>Encounter more severe IR drop issue.</a:t>
-                </a:r>
-              </a:p>
-              <a:p>
-                <a:pPr lvl="1">
-                  <a:lnSpc>
-                    <a:spcPct val="150000"/>
-                  </a:lnSpc>
-                </a:pPr>
-                <a:r>
-                  <a:rPr lang="en-US" altLang="zh-TW" sz="1800" dirty="0">
-                    <a:latin typeface="+mj-lt"/>
-                  </a:rPr>
-                  <a:t>Use sub-mesh reduce wire resistance and provide more via tapping location.</a:t>
-                </a:r>
-              </a:p>
-            </p:txBody>
-          </p:sp>
-        </mc:Choice>
-        <mc:Fallback xmlns="">
-          <p:sp>
-            <p:nvSpPr>
-              <p:cNvPr id="3" name="內容版面配置區 2">
-                <a:extLst>
-                  <a:ext uri="{FF2B5EF4-FFF2-40B4-BE49-F238E27FC236}">
-                    <a16:creationId xmlns:a16="http://schemas.microsoft.com/office/drawing/2014/main" id="{2BF1C42E-208D-D375-D779-4FE5706E52D6}"/>
-                  </a:ext>
-                </a:extLst>
-              </p:cNvPr>
-              <p:cNvSpPr>
-                <a:spLocks noGrp="1" noRot="1" noChangeAspect="1" noMove="1" noResize="1" noEditPoints="1" noAdjustHandles="1" noChangeArrowheads="1" noChangeShapeType="1" noTextEdit="1"/>
-              </p:cNvSpPr>
-              <p:nvPr>
-                <p:ph idx="1"/>
-              </p:nvPr>
-            </p:nvSpPr>
-            <p:spPr>
-              <a:xfrm>
-                <a:off x="838200" y="1620000"/>
-                <a:ext cx="10515600" cy="4895850"/>
-              </a:xfrm>
-              <a:blipFill>
-                <a:blip r:embed="rId3"/>
-                <a:stretch>
-                  <a:fillRect l="-696"/>
-                </a:stretch>
-              </a:blipFill>
-            </p:spPr>
-            <p:txBody>
-              <a:bodyPr/>
-              <a:lstStyle/>
-              <a:p>
-                <a:r>
-                  <a:rPr lang="zh-TW" altLang="en-US">
-                    <a:noFill/>
-                  </a:rPr>
-                  <a:t> </a:t>
-                </a:r>
-              </a:p>
-            </p:txBody>
-          </p:sp>
-        </mc:Fallback>
-      </mc:AlternateContent>
+      <p:sp>
+        <p:nvSpPr>
+          <p:cNvPr id="3" name="內容版面配置區 2">
+            <a:extLst>
+              <a:ext uri="{FF2B5EF4-FFF2-40B4-BE49-F238E27FC236}">
+                <a16:creationId xmlns:a16="http://schemas.microsoft.com/office/drawing/2014/main" id="{F671C038-AE51-E136-6B1E-6C38BF235BBE}"/>
+              </a:ext>
+            </a:extLst>
+          </p:cNvPr>
+          <p:cNvSpPr>
+            <a:spLocks noGrp="1"/>
+          </p:cNvSpPr>
+          <p:nvPr>
+            <p:ph idx="1"/>
+          </p:nvPr>
+        </p:nvSpPr>
+        <p:spPr bwMode="auto">
+          <a:xfrm>
+            <a:off x="838200" y="1620000"/>
+            <a:ext cx="10515600" cy="4351338"/>
+          </a:xfrm>
+        </p:spPr>
+        <p:txBody>
+          <a:bodyPr>
+            <a:normAutofit/>
+          </a:bodyPr>
+          <a:lstStyle/>
+          <a:p>
+            <a:pPr>
+              <a:lnSpc>
+                <a:spcPct val="150000"/>
+              </a:lnSpc>
+            </a:pPr>
+            <a:r>
+              <a:rPr lang="en-US" altLang="zh-TW" sz="2400" dirty="0">
+                <a:solidFill>
+                  <a:schemeClr val="bg1">
+                    <a:lumMod val="65000"/>
+                  </a:schemeClr>
+                </a:solidFill>
+              </a:rPr>
+              <a:t>Introduction</a:t>
+            </a:r>
+          </a:p>
+          <a:p>
+            <a:pPr>
+              <a:lnSpc>
+                <a:spcPct val="150000"/>
+              </a:lnSpc>
+            </a:pPr>
+            <a:r>
+              <a:rPr lang="en-US" altLang="zh-TW" sz="2400" dirty="0"/>
+              <a:t>Preliminaries</a:t>
+            </a:r>
+          </a:p>
+          <a:p>
+            <a:pPr>
+              <a:lnSpc>
+                <a:spcPct val="150000"/>
+              </a:lnSpc>
+            </a:pPr>
+            <a:r>
+              <a:rPr lang="en-US" altLang="zh-TW" sz="2400" dirty="0">
+                <a:solidFill>
+                  <a:schemeClr val="bg1">
+                    <a:lumMod val="65000"/>
+                  </a:schemeClr>
+                </a:solidFill>
+              </a:rPr>
+              <a:t>Methodology</a:t>
+            </a:r>
+          </a:p>
+          <a:p>
+            <a:pPr>
+              <a:lnSpc>
+                <a:spcPct val="150000"/>
+              </a:lnSpc>
+            </a:pPr>
+            <a:r>
+              <a:rPr lang="en-US" altLang="zh-TW" sz="2400" dirty="0">
+                <a:solidFill>
+                  <a:schemeClr val="bg1">
+                    <a:lumMod val="65000"/>
+                  </a:schemeClr>
+                </a:solidFill>
+              </a:rPr>
+              <a:t>Experimental</a:t>
+            </a:r>
+            <a:r>
+              <a:rPr lang="en-US" altLang="zh-TW" dirty="0">
+                <a:solidFill>
+                  <a:schemeClr val="bg1">
+                    <a:lumMod val="65000"/>
+                  </a:schemeClr>
+                </a:solidFill>
+              </a:rPr>
+              <a:t> </a:t>
+            </a:r>
+            <a:r>
+              <a:rPr lang="en-US" altLang="zh-TW" sz="2400" dirty="0">
+                <a:solidFill>
+                  <a:schemeClr val="bg1">
+                    <a:lumMod val="65000"/>
+                  </a:schemeClr>
+                </a:solidFill>
+              </a:rPr>
+              <a:t>Results</a:t>
+            </a:r>
+            <a:endParaRPr lang="zh-TW" altLang="en-US" dirty="0">
+              <a:solidFill>
+                <a:schemeClr val="bg1">
+                  <a:lumMod val="65000"/>
+                </a:schemeClr>
+              </a:solidFill>
+            </a:endParaRPr>
+          </a:p>
+        </p:txBody>
+      </p:sp>
       <p:sp>
         <p:nvSpPr>
           <p:cNvPr id="4" name="投影片編號版面配置區 3">
             <a:extLst>
               <a:ext uri="{FF2B5EF4-FFF2-40B4-BE49-F238E27FC236}">
-                <a16:creationId xmlns:a16="http://schemas.microsoft.com/office/drawing/2014/main" id="{75FE7E51-3153-478A-D8A4-7E30B3D4AF4C}"/>
+                <a16:creationId xmlns:a16="http://schemas.microsoft.com/office/drawing/2014/main" id="{5891B803-9796-C957-1032-D2F5DFAFFD47}"/>
               </a:ext>
             </a:extLst>
           </p:cNvPr>
@@ -13733,40 +14879,10 @@
           </a:p>
         </p:txBody>
       </p:sp>
-      <p:pic>
-        <p:nvPicPr>
-          <p:cNvPr id="6" name="圖片 5">
-            <a:extLst>
-              <a:ext uri="{FF2B5EF4-FFF2-40B4-BE49-F238E27FC236}">
-                <a16:creationId xmlns:a16="http://schemas.microsoft.com/office/drawing/2014/main" id="{CE6AB594-E603-3F82-6564-C5CA8573E9C0}"/>
-              </a:ext>
-            </a:extLst>
-          </p:cNvPr>
-          <p:cNvPicPr>
-            <a:picLocks noChangeAspect="1"/>
-          </p:cNvPicPr>
-          <p:nvPr/>
-        </p:nvPicPr>
-        <p:blipFill>
-          <a:blip r:embed="rId4"/>
-          <a:stretch>
-            <a:fillRect/>
-          </a:stretch>
-        </p:blipFill>
-        <p:spPr>
-          <a:xfrm>
-            <a:off x="6096000" y="136525"/>
-            <a:ext cx="5465894" cy="2103012"/>
-          </a:xfrm>
-          <a:prstGeom prst="rect">
-            <a:avLst/>
-          </a:prstGeom>
-        </p:spPr>
-      </p:pic>
     </p:spTree>
     <p:extLst>
       <p:ext uri="{BB962C8B-B14F-4D97-AF65-F5344CB8AC3E}">
-        <p14:creationId xmlns:p14="http://schemas.microsoft.com/office/powerpoint/2010/main" val="3284811820"/>
+        <p14:creationId xmlns:p14="http://schemas.microsoft.com/office/powerpoint/2010/main" val="3475085156"/>
       </p:ext>
     </p:extLst>
   </p:cSld>

</xml_diff>